<commit_message>
MOD01 - Create PDFs
</commit_message>
<xml_diff>
--- a/MOD00-Introduccion/01 Presentacion/MOD00_PPTX_Introduccion.pptx
+++ b/MOD00-Introduccion/01 Presentacion/MOD00_PPTX_Introduccion.pptx
@@ -5,16 +5,17 @@
     <p:sldMasterId id="2147483648" r:id="rId1"/>
   </p:sldMasterIdLst>
   <p:notesMasterIdLst>
-    <p:notesMasterId r:id="rId9"/>
+    <p:notesMasterId r:id="rId10"/>
   </p:notesMasterIdLst>
   <p:sldIdLst>
     <p:sldId id="264" r:id="rId2"/>
     <p:sldId id="268" r:id="rId3"/>
-    <p:sldId id="269" r:id="rId4"/>
-    <p:sldId id="270" r:id="rId5"/>
-    <p:sldId id="271" r:id="rId6"/>
-    <p:sldId id="272" r:id="rId7"/>
-    <p:sldId id="273" r:id="rId8"/>
+    <p:sldId id="274" r:id="rId4"/>
+    <p:sldId id="269" r:id="rId5"/>
+    <p:sldId id="270" r:id="rId6"/>
+    <p:sldId id="271" r:id="rId7"/>
+    <p:sldId id="272" r:id="rId8"/>
+    <p:sldId id="273" r:id="rId9"/>
   </p:sldIdLst>
   <p:sldSz cx="12192000" cy="6858000"/>
   <p:notesSz cx="6858000" cy="9144000"/>
@@ -203,7 +204,7 @@
           <a:p>
             <a:fld id="{AAE4AFBC-240D-4EE3-A51D-9BF56B6EF822}" type="datetimeFigureOut">
               <a:rPr lang="en-US" smtClean="0"/>
-              <a:t>8/7/2020</a:t>
+              <a:t>8/11/2020</a:t>
             </a:fld>
             <a:endParaRPr lang="en-US"/>
           </a:p>
@@ -723,7 +724,175 @@
     </p:spTree>
     <p:extLst>
       <p:ext uri="{BB962C8B-B14F-4D97-AF65-F5344CB8AC3E}">
+        <p14:creationId xmlns:p14="http://schemas.microsoft.com/office/powerpoint/2010/main" val="2816328141"/>
+      </p:ext>
+    </p:extLst>
+  </p:cSld>
+  <p:clrMapOvr>
+    <a:masterClrMapping/>
+  </p:clrMapOvr>
+</p:notes>
+</file>
+
+<file path=ppt/notesSlides/notesSlide3.xml><?xml version="1.0" encoding="utf-8"?>
+<p:notes xmlns:a="http://schemas.openxmlformats.org/drawingml/2006/main" xmlns:r="http://schemas.openxmlformats.org/officeDocument/2006/relationships" xmlns:p="http://schemas.openxmlformats.org/presentationml/2006/main">
+  <p:cSld>
+    <p:spTree>
+      <p:nvGrpSpPr>
+        <p:cNvPr id="1" name=""/>
+        <p:cNvGrpSpPr/>
+        <p:nvPr/>
+      </p:nvGrpSpPr>
+      <p:grpSpPr>
+        <a:xfrm>
+          <a:off x="0" y="0"/>
+          <a:ext cx="0" cy="0"/>
+          <a:chOff x="0" y="0"/>
+          <a:chExt cx="0" cy="0"/>
+        </a:xfrm>
+      </p:grpSpPr>
+      <p:sp>
+        <p:nvSpPr>
+          <p:cNvPr id="2" name="Slide Image Placeholder 1"/>
+          <p:cNvSpPr>
+            <a:spLocks noGrp="1" noRot="1" noChangeAspect="1"/>
+          </p:cNvSpPr>
+          <p:nvPr>
+            <p:ph type="sldImg"/>
+          </p:nvPr>
+        </p:nvSpPr>
+        <p:spPr/>
+      </p:sp>
+      <p:sp>
+        <p:nvSpPr>
+          <p:cNvPr id="3" name="Notes Placeholder 2"/>
+          <p:cNvSpPr>
+            <a:spLocks noGrp="1"/>
+          </p:cNvSpPr>
+          <p:nvPr>
+            <p:ph type="body" idx="1"/>
+          </p:nvPr>
+        </p:nvSpPr>
+        <p:spPr/>
+        <p:txBody>
+          <a:bodyPr/>
+          <a:lstStyle/>
+          <a:p>
+            <a:endParaRPr lang="en-US" dirty="0"/>
+          </a:p>
+        </p:txBody>
+      </p:sp>
+      <p:sp>
+        <p:nvSpPr>
+          <p:cNvPr id="4" name="Slide Number Placeholder 3"/>
+          <p:cNvSpPr>
+            <a:spLocks noGrp="1"/>
+          </p:cNvSpPr>
+          <p:nvPr>
+            <p:ph type="sldNum" sz="quarter" idx="5"/>
+          </p:nvPr>
+        </p:nvSpPr>
+        <p:spPr/>
+        <p:txBody>
+          <a:bodyPr/>
+          <a:lstStyle/>
+          <a:p>
+            <a:fld id="{D196449B-AD69-420F-92B7-5A2FA9DA0D82}" type="slidenum">
+              <a:rPr lang="en-US" smtClean="0"/>
+              <a:t>4</a:t>
+            </a:fld>
+            <a:endParaRPr lang="en-US"/>
+          </a:p>
+        </p:txBody>
+      </p:sp>
+    </p:spTree>
+    <p:extLst>
+      <p:ext uri="{BB962C8B-B14F-4D97-AF65-F5344CB8AC3E}">
         <p14:creationId xmlns:p14="http://schemas.microsoft.com/office/powerpoint/2010/main" val="1472526478"/>
+      </p:ext>
+    </p:extLst>
+  </p:cSld>
+  <p:clrMapOvr>
+    <a:masterClrMapping/>
+  </p:clrMapOvr>
+</p:notes>
+</file>
+
+<file path=ppt/notesSlides/notesSlide4.xml><?xml version="1.0" encoding="utf-8"?>
+<p:notes xmlns:a="http://schemas.openxmlformats.org/drawingml/2006/main" xmlns:r="http://schemas.openxmlformats.org/officeDocument/2006/relationships" xmlns:p="http://schemas.openxmlformats.org/presentationml/2006/main">
+  <p:cSld>
+    <p:spTree>
+      <p:nvGrpSpPr>
+        <p:cNvPr id="1" name=""/>
+        <p:cNvGrpSpPr/>
+        <p:nvPr/>
+      </p:nvGrpSpPr>
+      <p:grpSpPr>
+        <a:xfrm>
+          <a:off x="0" y="0"/>
+          <a:ext cx="0" cy="0"/>
+          <a:chOff x="0" y="0"/>
+          <a:chExt cx="0" cy="0"/>
+        </a:xfrm>
+      </p:grpSpPr>
+      <p:sp>
+        <p:nvSpPr>
+          <p:cNvPr id="2" name="Slide Image Placeholder 1"/>
+          <p:cNvSpPr>
+            <a:spLocks noGrp="1" noRot="1" noChangeAspect="1"/>
+          </p:cNvSpPr>
+          <p:nvPr>
+            <p:ph type="sldImg"/>
+          </p:nvPr>
+        </p:nvSpPr>
+        <p:spPr/>
+      </p:sp>
+      <p:sp>
+        <p:nvSpPr>
+          <p:cNvPr id="3" name="Notes Placeholder 2"/>
+          <p:cNvSpPr>
+            <a:spLocks noGrp="1"/>
+          </p:cNvSpPr>
+          <p:nvPr>
+            <p:ph type="body" idx="1"/>
+          </p:nvPr>
+        </p:nvSpPr>
+        <p:spPr/>
+        <p:txBody>
+          <a:bodyPr/>
+          <a:lstStyle/>
+          <a:p>
+            <a:endParaRPr lang="en-US" dirty="0"/>
+          </a:p>
+        </p:txBody>
+      </p:sp>
+      <p:sp>
+        <p:nvSpPr>
+          <p:cNvPr id="4" name="Slide Number Placeholder 3"/>
+          <p:cNvSpPr>
+            <a:spLocks noGrp="1"/>
+          </p:cNvSpPr>
+          <p:nvPr>
+            <p:ph type="sldNum" sz="quarter" idx="5"/>
+          </p:nvPr>
+        </p:nvSpPr>
+        <p:spPr/>
+        <p:txBody>
+          <a:bodyPr/>
+          <a:lstStyle/>
+          <a:p>
+            <a:fld id="{D196449B-AD69-420F-92B7-5A2FA9DA0D82}" type="slidenum">
+              <a:rPr lang="en-US" smtClean="0"/>
+              <a:t>8</a:t>
+            </a:fld>
+            <a:endParaRPr lang="en-US"/>
+          </a:p>
+        </p:txBody>
+      </p:sp>
+    </p:spTree>
+    <p:extLst>
+      <p:ext uri="{BB962C8B-B14F-4D97-AF65-F5344CB8AC3E}">
+        <p14:creationId xmlns:p14="http://schemas.microsoft.com/office/powerpoint/2010/main" val="2801299769"/>
       </p:ext>
     </p:extLst>
   </p:cSld>
@@ -862,7 +1031,7 @@
           <a:p>
             <a:fld id="{3FDFAF59-80FD-42F8-B77B-6179688B7234}" type="datetimeFigureOut">
               <a:rPr lang="de-DE" smtClean="0"/>
-              <a:t>07.08.2020</a:t>
+              <a:t>11.08.2020</a:t>
             </a:fld>
             <a:endParaRPr lang="de-DE"/>
           </a:p>
@@ -1030,7 +1199,7 @@
           <a:p>
             <a:fld id="{3FDFAF59-80FD-42F8-B77B-6179688B7234}" type="datetimeFigureOut">
               <a:rPr lang="de-DE" smtClean="0"/>
-              <a:t>07.08.2020</a:t>
+              <a:t>11.08.2020</a:t>
             </a:fld>
             <a:endParaRPr lang="de-DE"/>
           </a:p>
@@ -1208,7 +1377,7 @@
           <a:p>
             <a:fld id="{3FDFAF59-80FD-42F8-B77B-6179688B7234}" type="datetimeFigureOut">
               <a:rPr lang="de-DE" smtClean="0"/>
-              <a:t>07.08.2020</a:t>
+              <a:t>11.08.2020</a:t>
             </a:fld>
             <a:endParaRPr lang="de-DE"/>
           </a:p>
@@ -1376,7 +1545,7 @@
           <a:p>
             <a:fld id="{3FDFAF59-80FD-42F8-B77B-6179688B7234}" type="datetimeFigureOut">
               <a:rPr lang="de-DE" smtClean="0"/>
-              <a:t>07.08.2020</a:t>
+              <a:t>11.08.2020</a:t>
             </a:fld>
             <a:endParaRPr lang="de-DE"/>
           </a:p>
@@ -1621,7 +1790,7 @@
           <a:p>
             <a:fld id="{3FDFAF59-80FD-42F8-B77B-6179688B7234}" type="datetimeFigureOut">
               <a:rPr lang="de-DE" smtClean="0"/>
-              <a:t>07.08.2020</a:t>
+              <a:t>11.08.2020</a:t>
             </a:fld>
             <a:endParaRPr lang="de-DE"/>
           </a:p>
@@ -1850,7 +2019,7 @@
           <a:p>
             <a:fld id="{3FDFAF59-80FD-42F8-B77B-6179688B7234}" type="datetimeFigureOut">
               <a:rPr lang="de-DE" smtClean="0"/>
-              <a:t>07.08.2020</a:t>
+              <a:t>11.08.2020</a:t>
             </a:fld>
             <a:endParaRPr lang="de-DE"/>
           </a:p>
@@ -2214,7 +2383,7 @@
           <a:p>
             <a:fld id="{3FDFAF59-80FD-42F8-B77B-6179688B7234}" type="datetimeFigureOut">
               <a:rPr lang="de-DE" smtClean="0"/>
-              <a:t>07.08.2020</a:t>
+              <a:t>11.08.2020</a:t>
             </a:fld>
             <a:endParaRPr lang="de-DE"/>
           </a:p>
@@ -2331,7 +2500,7 @@
           <a:p>
             <a:fld id="{3FDFAF59-80FD-42F8-B77B-6179688B7234}" type="datetimeFigureOut">
               <a:rPr lang="de-DE" smtClean="0"/>
-              <a:t>07.08.2020</a:t>
+              <a:t>11.08.2020</a:t>
             </a:fld>
             <a:endParaRPr lang="de-DE"/>
           </a:p>
@@ -2426,7 +2595,7 @@
           <a:p>
             <a:fld id="{3FDFAF59-80FD-42F8-B77B-6179688B7234}" type="datetimeFigureOut">
               <a:rPr lang="de-DE" smtClean="0"/>
-              <a:t>07.08.2020</a:t>
+              <a:t>11.08.2020</a:t>
             </a:fld>
             <a:endParaRPr lang="de-DE"/>
           </a:p>
@@ -2701,7 +2870,7 @@
           <a:p>
             <a:fld id="{3FDFAF59-80FD-42F8-B77B-6179688B7234}" type="datetimeFigureOut">
               <a:rPr lang="de-DE" smtClean="0"/>
-              <a:t>07.08.2020</a:t>
+              <a:t>11.08.2020</a:t>
             </a:fld>
             <a:endParaRPr lang="de-DE"/>
           </a:p>
@@ -2953,7 +3122,7 @@
           <a:p>
             <a:fld id="{3FDFAF59-80FD-42F8-B77B-6179688B7234}" type="datetimeFigureOut">
               <a:rPr lang="de-DE" smtClean="0"/>
-              <a:t>07.08.2020</a:t>
+              <a:t>11.08.2020</a:t>
             </a:fld>
             <a:endParaRPr lang="de-DE"/>
           </a:p>
@@ -3167,7 +3336,7 @@
           <a:p>
             <a:fld id="{3FDFAF59-80FD-42F8-B77B-6179688B7234}" type="datetimeFigureOut">
               <a:rPr lang="de-DE" smtClean="0"/>
-              <a:t>07.08.2020</a:t>
+              <a:t>11.08.2020</a:t>
             </a:fld>
             <a:endParaRPr lang="de-DE"/>
           </a:p>
@@ -3997,10 +4166,19 @@
                 </a:solidFill>
                 <a:latin typeface="Tw Cen MT" panose="020B0602020104020603" pitchFamily="34" charset="0"/>
               </a:rPr>
-              <a:t> Agosto-</a:t>
+              <a:t> </a:t>
             </a:r>
             <a:r>
-              <a:rPr lang="en-US" sz="4100" dirty="0" err="1">
+              <a:rPr lang="en-US" sz="4100">
+                <a:solidFill>
+                  <a:srgbClr val="52CBBE"/>
+                </a:solidFill>
+                <a:latin typeface="Tw Cen MT" panose="020B0602020104020603" pitchFamily="34" charset="0"/>
+              </a:rPr>
+              <a:t>Agosto-</a:t>
+            </a:r>
+            <a:r>
+              <a:rPr lang="en-US" sz="4100" err="1">
                 <a:solidFill>
                   <a:srgbClr val="52CBBE"/>
                 </a:solidFill>
@@ -4009,14 +4187,20 @@
               <a:t>Diciembre</a:t>
             </a:r>
             <a:r>
-              <a:rPr lang="en-US" sz="4100" dirty="0">
+              <a:rPr lang="en-US" sz="4100">
                 <a:solidFill>
                   <a:srgbClr val="52CBBE"/>
                 </a:solidFill>
                 <a:latin typeface="Tw Cen MT" panose="020B0602020104020603" pitchFamily="34" charset="0"/>
               </a:rPr>
-              <a:t> 2019</a:t>
+              <a:t> 2020</a:t>
             </a:r>
+            <a:endParaRPr lang="en-US" sz="4100" dirty="0">
+              <a:solidFill>
+                <a:srgbClr val="52CBBE"/>
+              </a:solidFill>
+              <a:latin typeface="Tw Cen MT" panose="020B0602020104020603" pitchFamily="34" charset="0"/>
+            </a:endParaRPr>
           </a:p>
         </p:txBody>
       </p:sp>
@@ -8631,6 +8815,2162 @@
 </file>
 
 <file path=ppt/slides/slide3.xml><?xml version="1.0" encoding="utf-8"?>
+<p:sld xmlns:a="http://schemas.openxmlformats.org/drawingml/2006/main" xmlns:r="http://schemas.openxmlformats.org/officeDocument/2006/relationships" xmlns:p="http://schemas.openxmlformats.org/presentationml/2006/main">
+  <p:cSld>
+    <p:spTree>
+      <p:nvGrpSpPr>
+        <p:cNvPr id="1" name=""/>
+        <p:cNvGrpSpPr/>
+        <p:nvPr/>
+      </p:nvGrpSpPr>
+      <p:grpSpPr>
+        <a:xfrm>
+          <a:off x="0" y="0"/>
+          <a:ext cx="0" cy="0"/>
+          <a:chOff x="0" y="0"/>
+          <a:chExt cx="0" cy="0"/>
+        </a:xfrm>
+      </p:grpSpPr>
+      <p:grpSp>
+        <p:nvGrpSpPr>
+          <p:cNvPr id="50" name="Group 49">
+            <a:extLst>
+              <a:ext uri="{FF2B5EF4-FFF2-40B4-BE49-F238E27FC236}">
+                <a16:creationId xmlns:a16="http://schemas.microsoft.com/office/drawing/2014/main" id="{066ACF4C-6F8C-46FC-8362-2E05C90EEAFA}"/>
+              </a:ext>
+            </a:extLst>
+          </p:cNvPr>
+          <p:cNvGrpSpPr/>
+          <p:nvPr/>
+        </p:nvGrpSpPr>
+        <p:grpSpPr>
+          <a:xfrm>
+            <a:off x="-145460" y="-26562"/>
+            <a:ext cx="12482920" cy="6858000"/>
+            <a:chOff x="-290920" y="0"/>
+            <a:chExt cx="12482920" cy="6858000"/>
+          </a:xfrm>
+        </p:grpSpPr>
+        <p:sp>
+          <p:nvSpPr>
+            <p:cNvPr id="51" name="Rectangle 50">
+              <a:extLst>
+                <a:ext uri="{FF2B5EF4-FFF2-40B4-BE49-F238E27FC236}">
+                  <a16:creationId xmlns:a16="http://schemas.microsoft.com/office/drawing/2014/main" id="{4F373113-18F1-4443-9A8E-5EF06C1D2FEA}"/>
+                </a:ext>
+              </a:extLst>
+            </p:cNvPr>
+            <p:cNvSpPr/>
+            <p:nvPr/>
+          </p:nvSpPr>
+          <p:spPr>
+            <a:xfrm>
+              <a:off x="-290920" y="0"/>
+              <a:ext cx="12482920" cy="6858000"/>
+            </a:xfrm>
+            <a:prstGeom prst="rect">
+              <a:avLst/>
+            </a:prstGeom>
+            <a:solidFill>
+              <a:srgbClr val="F0EEF0"/>
+            </a:solidFill>
+            <a:ln>
+              <a:noFill/>
+            </a:ln>
+            <a:effectLst>
+              <a:outerShdw blurRad="215900" dist="38100" sx="101000" sy="101000" algn="l" rotWithShape="0">
+                <a:schemeClr val="tx1">
+                  <a:lumMod val="65000"/>
+                  <a:lumOff val="35000"/>
+                  <a:alpha val="35000"/>
+                </a:schemeClr>
+              </a:outerShdw>
+            </a:effectLst>
+          </p:spPr>
+          <p:style>
+            <a:lnRef idx="2">
+              <a:schemeClr val="accent1">
+                <a:shade val="50000"/>
+              </a:schemeClr>
+            </a:lnRef>
+            <a:fillRef idx="1">
+              <a:schemeClr val="accent1"/>
+            </a:fillRef>
+            <a:effectRef idx="0">
+              <a:schemeClr val="accent1"/>
+            </a:effectRef>
+            <a:fontRef idx="minor">
+              <a:schemeClr val="lt1"/>
+            </a:fontRef>
+          </p:style>
+          <p:txBody>
+            <a:bodyPr rtlCol="0" anchor="ctr"/>
+            <a:lstStyle/>
+            <a:p>
+              <a:pPr algn="ctr"/>
+              <a:endParaRPr lang="en-US" dirty="0"/>
+            </a:p>
+          </p:txBody>
+        </p:sp>
+        <p:sp>
+          <p:nvSpPr>
+            <p:cNvPr id="52" name="Freeform: Shape 51">
+              <a:extLst>
+                <a:ext uri="{FF2B5EF4-FFF2-40B4-BE49-F238E27FC236}">
+                  <a16:creationId xmlns:a16="http://schemas.microsoft.com/office/drawing/2014/main" id="{8F99D053-FB83-41F1-B2CB-C10918BC99BC}"/>
+                </a:ext>
+              </a:extLst>
+            </p:cNvPr>
+            <p:cNvSpPr/>
+            <p:nvPr/>
+          </p:nvSpPr>
+          <p:spPr>
+            <a:xfrm>
+              <a:off x="11023600" y="2337441"/>
+              <a:ext cx="1168400" cy="2360918"/>
+            </a:xfrm>
+            <a:custGeom>
+              <a:avLst/>
+              <a:gdLst>
+                <a:gd name="connsiteX0" fmla="*/ 1168400 w 1168400"/>
+                <a:gd name="connsiteY0" fmla="*/ 0 h 2360918"/>
+                <a:gd name="connsiteX1" fmla="*/ 1168400 w 1168400"/>
+                <a:gd name="connsiteY1" fmla="*/ 2360918 h 2360918"/>
+                <a:gd name="connsiteX2" fmla="*/ 1060340 w 1168400"/>
+                <a:gd name="connsiteY2" fmla="*/ 2355461 h 2360918"/>
+                <a:gd name="connsiteX3" fmla="*/ 0 w 1168400"/>
+                <a:gd name="connsiteY3" fmla="*/ 1180459 h 2360918"/>
+                <a:gd name="connsiteX4" fmla="*/ 1060340 w 1168400"/>
+                <a:gd name="connsiteY4" fmla="*/ 5457 h 2360918"/>
+              </a:gdLst>
+              <a:ahLst/>
+              <a:cxnLst>
+                <a:cxn ang="0">
+                  <a:pos x="connsiteX0" y="connsiteY0"/>
+                </a:cxn>
+                <a:cxn ang="0">
+                  <a:pos x="connsiteX1" y="connsiteY1"/>
+                </a:cxn>
+                <a:cxn ang="0">
+                  <a:pos x="connsiteX2" y="connsiteY2"/>
+                </a:cxn>
+                <a:cxn ang="0">
+                  <a:pos x="connsiteX3" y="connsiteY3"/>
+                </a:cxn>
+                <a:cxn ang="0">
+                  <a:pos x="connsiteX4" y="connsiteY4"/>
+                </a:cxn>
+              </a:cxnLst>
+              <a:rect l="l" t="t" r="r" b="b"/>
+              <a:pathLst>
+                <a:path w="1168400" h="2360918">
+                  <a:moveTo>
+                    <a:pt x="1168400" y="0"/>
+                  </a:moveTo>
+                  <a:lnTo>
+                    <a:pt x="1168400" y="2360918"/>
+                  </a:lnTo>
+                  <a:lnTo>
+                    <a:pt x="1060340" y="2355461"/>
+                  </a:lnTo>
+                  <a:cubicBezTo>
+                    <a:pt x="464762" y="2294977"/>
+                    <a:pt x="0" y="1791994"/>
+                    <a:pt x="0" y="1180459"/>
+                  </a:cubicBezTo>
+                  <a:cubicBezTo>
+                    <a:pt x="0" y="568924"/>
+                    <a:pt x="464762" y="65941"/>
+                    <a:pt x="1060340" y="5457"/>
+                  </a:cubicBezTo>
+                  <a:close/>
+                </a:path>
+              </a:pathLst>
+            </a:custGeom>
+            <a:solidFill>
+              <a:srgbClr val="FF5969"/>
+            </a:solidFill>
+            <a:ln>
+              <a:noFill/>
+            </a:ln>
+          </p:spPr>
+          <p:style>
+            <a:lnRef idx="2">
+              <a:schemeClr val="accent1">
+                <a:shade val="50000"/>
+              </a:schemeClr>
+            </a:lnRef>
+            <a:fillRef idx="1">
+              <a:schemeClr val="accent1"/>
+            </a:fillRef>
+            <a:effectRef idx="0">
+              <a:schemeClr val="accent1"/>
+            </a:effectRef>
+            <a:fontRef idx="minor">
+              <a:schemeClr val="lt1"/>
+            </a:fontRef>
+          </p:style>
+          <p:txBody>
+            <a:bodyPr rtlCol="0" anchor="ctr"/>
+            <a:lstStyle/>
+            <a:p>
+              <a:pPr algn="ctr"/>
+              <a:endParaRPr lang="en-US"/>
+            </a:p>
+          </p:txBody>
+        </p:sp>
+        <p:sp>
+          <p:nvSpPr>
+            <p:cNvPr id="53" name="TextBox 52">
+              <a:extLst>
+                <a:ext uri="{FF2B5EF4-FFF2-40B4-BE49-F238E27FC236}">
+                  <a16:creationId xmlns:a16="http://schemas.microsoft.com/office/drawing/2014/main" id="{7F4373C1-3934-47C3-8F36-E2FB2615CA87}"/>
+                </a:ext>
+              </a:extLst>
+            </p:cNvPr>
+            <p:cNvSpPr txBox="1"/>
+            <p:nvPr/>
+          </p:nvSpPr>
+          <p:spPr>
+            <a:xfrm rot="16200000">
+              <a:off x="10872792" y="3194734"/>
+              <a:ext cx="1992086" cy="646331"/>
+            </a:xfrm>
+            <a:prstGeom prst="rect">
+              <a:avLst/>
+            </a:prstGeom>
+            <a:noFill/>
+          </p:spPr>
+          <p:txBody>
+            <a:bodyPr wrap="square" rtlCol="0">
+              <a:spAutoFit/>
+            </a:bodyPr>
+            <a:lstStyle/>
+            <a:p>
+              <a:pPr algn="ctr"/>
+              <a:r>
+                <a:rPr lang="en-US" sz="3600" b="1" dirty="0" err="1">
+                  <a:solidFill>
+                    <a:srgbClr val="F0EEF0"/>
+                  </a:solidFill>
+                  <a:latin typeface="Tw Cen MT" panose="020B0602020104020603" pitchFamily="34" charset="0"/>
+                </a:rPr>
+                <a:t>curso</a:t>
+              </a:r>
+              <a:endParaRPr lang="en-US" sz="3600" b="1" dirty="0">
+                <a:solidFill>
+                  <a:srgbClr val="F0EEF0"/>
+                </a:solidFill>
+                <a:latin typeface="Tw Cen MT" panose="020B0602020104020603" pitchFamily="34" charset="0"/>
+              </a:endParaRPr>
+            </a:p>
+          </p:txBody>
+        </p:sp>
+        <p:pic>
+          <p:nvPicPr>
+            <p:cNvPr id="54" name="Picture 53">
+              <a:extLst>
+                <a:ext uri="{FF2B5EF4-FFF2-40B4-BE49-F238E27FC236}">
+                  <a16:creationId xmlns:a16="http://schemas.microsoft.com/office/drawing/2014/main" id="{5A5E18E8-5A3E-4F1D-8254-6193AA55C07B}"/>
+                </a:ext>
+              </a:extLst>
+            </p:cNvPr>
+            <p:cNvPicPr>
+              <a:picLocks noChangeAspect="1"/>
+            </p:cNvPicPr>
+            <p:nvPr/>
+          </p:nvPicPr>
+          <p:blipFill>
+            <a:blip r:embed="rId3">
+              <a:extLst>
+                <a:ext uri="{28A0092B-C50C-407E-A947-70E740481C1C}">
+                  <a14:useLocalDpi xmlns:a14="http://schemas.microsoft.com/office/drawing/2010/main" val="0"/>
+                </a:ext>
+              </a:extLst>
+            </a:blip>
+            <a:stretch>
+              <a:fillRect/>
+            </a:stretch>
+          </p:blipFill>
+          <p:spPr>
+            <a:xfrm rot="16200000">
+              <a:off x="11129999" y="3247473"/>
+              <a:ext cx="530600" cy="530600"/>
+            </a:xfrm>
+            <a:prstGeom prst="rect">
+              <a:avLst/>
+            </a:prstGeom>
+          </p:spPr>
+        </p:pic>
+      </p:grpSp>
+      <p:grpSp>
+        <p:nvGrpSpPr>
+          <p:cNvPr id="55" name="Group 54">
+            <a:extLst>
+              <a:ext uri="{FF2B5EF4-FFF2-40B4-BE49-F238E27FC236}">
+                <a16:creationId xmlns:a16="http://schemas.microsoft.com/office/drawing/2014/main" id="{150C247F-7990-4945-869D-5E2A900F477F}"/>
+              </a:ext>
+            </a:extLst>
+          </p:cNvPr>
+          <p:cNvGrpSpPr/>
+          <p:nvPr/>
+        </p:nvGrpSpPr>
+        <p:grpSpPr>
+          <a:xfrm>
+            <a:off x="-8798784" y="0"/>
+            <a:ext cx="11447503" cy="6858000"/>
+            <a:chOff x="213096" y="0"/>
+            <a:chExt cx="11447503" cy="6858000"/>
+          </a:xfrm>
+        </p:grpSpPr>
+        <p:sp>
+          <p:nvSpPr>
+            <p:cNvPr id="56" name="Rectangle 55">
+              <a:extLst>
+                <a:ext uri="{FF2B5EF4-FFF2-40B4-BE49-F238E27FC236}">
+                  <a16:creationId xmlns:a16="http://schemas.microsoft.com/office/drawing/2014/main" id="{6D2C93AC-EBE3-4E67-A867-76D5D6BEDB10}"/>
+                </a:ext>
+              </a:extLst>
+            </p:cNvPr>
+            <p:cNvSpPr/>
+            <p:nvPr/>
+          </p:nvSpPr>
+          <p:spPr>
+            <a:xfrm>
+              <a:off x="213096" y="0"/>
+              <a:ext cx="11447501" cy="6858000"/>
+            </a:xfrm>
+            <a:prstGeom prst="rect">
+              <a:avLst/>
+            </a:prstGeom>
+            <a:solidFill>
+              <a:srgbClr val="F0EEF0"/>
+            </a:solidFill>
+            <a:ln>
+              <a:noFill/>
+            </a:ln>
+            <a:effectLst>
+              <a:outerShdw blurRad="215900" dist="38100" sx="101000" sy="101000" algn="l" rotWithShape="0">
+                <a:schemeClr val="tx1">
+                  <a:lumMod val="65000"/>
+                  <a:lumOff val="35000"/>
+                  <a:alpha val="35000"/>
+                </a:schemeClr>
+              </a:outerShdw>
+            </a:effectLst>
+          </p:spPr>
+          <p:style>
+            <a:lnRef idx="2">
+              <a:schemeClr val="accent1">
+                <a:shade val="50000"/>
+              </a:schemeClr>
+            </a:lnRef>
+            <a:fillRef idx="1">
+              <a:schemeClr val="accent1"/>
+            </a:fillRef>
+            <a:effectRef idx="0">
+              <a:schemeClr val="accent1"/>
+            </a:effectRef>
+            <a:fontRef idx="minor">
+              <a:schemeClr val="lt1"/>
+            </a:fontRef>
+          </p:style>
+          <p:txBody>
+            <a:bodyPr rtlCol="0" anchor="ctr"/>
+            <a:lstStyle/>
+            <a:p>
+              <a:pPr algn="ctr"/>
+              <a:endParaRPr lang="en-US" dirty="0"/>
+            </a:p>
+          </p:txBody>
+        </p:sp>
+        <p:sp>
+          <p:nvSpPr>
+            <p:cNvPr id="57" name="Freeform: Shape 56">
+              <a:extLst>
+                <a:ext uri="{FF2B5EF4-FFF2-40B4-BE49-F238E27FC236}">
+                  <a16:creationId xmlns:a16="http://schemas.microsoft.com/office/drawing/2014/main" id="{35DBD2B9-E73C-4AE9-91C9-698379867E98}"/>
+                </a:ext>
+              </a:extLst>
+            </p:cNvPr>
+            <p:cNvSpPr/>
+            <p:nvPr/>
+          </p:nvSpPr>
+          <p:spPr>
+            <a:xfrm>
+              <a:off x="10492197" y="2337441"/>
+              <a:ext cx="1168400" cy="2360918"/>
+            </a:xfrm>
+            <a:custGeom>
+              <a:avLst/>
+              <a:gdLst>
+                <a:gd name="connsiteX0" fmla="*/ 1168400 w 1168400"/>
+                <a:gd name="connsiteY0" fmla="*/ 0 h 2360918"/>
+                <a:gd name="connsiteX1" fmla="*/ 1168400 w 1168400"/>
+                <a:gd name="connsiteY1" fmla="*/ 2360918 h 2360918"/>
+                <a:gd name="connsiteX2" fmla="*/ 1060340 w 1168400"/>
+                <a:gd name="connsiteY2" fmla="*/ 2355461 h 2360918"/>
+                <a:gd name="connsiteX3" fmla="*/ 0 w 1168400"/>
+                <a:gd name="connsiteY3" fmla="*/ 1180459 h 2360918"/>
+                <a:gd name="connsiteX4" fmla="*/ 1060340 w 1168400"/>
+                <a:gd name="connsiteY4" fmla="*/ 5457 h 2360918"/>
+              </a:gdLst>
+              <a:ahLst/>
+              <a:cxnLst>
+                <a:cxn ang="0">
+                  <a:pos x="connsiteX0" y="connsiteY0"/>
+                </a:cxn>
+                <a:cxn ang="0">
+                  <a:pos x="connsiteX1" y="connsiteY1"/>
+                </a:cxn>
+                <a:cxn ang="0">
+                  <a:pos x="connsiteX2" y="connsiteY2"/>
+                </a:cxn>
+                <a:cxn ang="0">
+                  <a:pos x="connsiteX3" y="connsiteY3"/>
+                </a:cxn>
+                <a:cxn ang="0">
+                  <a:pos x="connsiteX4" y="connsiteY4"/>
+                </a:cxn>
+              </a:cxnLst>
+              <a:rect l="l" t="t" r="r" b="b"/>
+              <a:pathLst>
+                <a:path w="1168400" h="2360918">
+                  <a:moveTo>
+                    <a:pt x="1168400" y="0"/>
+                  </a:moveTo>
+                  <a:lnTo>
+                    <a:pt x="1168400" y="2360918"/>
+                  </a:lnTo>
+                  <a:lnTo>
+                    <a:pt x="1060340" y="2355461"/>
+                  </a:lnTo>
+                  <a:cubicBezTo>
+                    <a:pt x="464762" y="2294977"/>
+                    <a:pt x="0" y="1791994"/>
+                    <a:pt x="0" y="1180459"/>
+                  </a:cubicBezTo>
+                  <a:cubicBezTo>
+                    <a:pt x="0" y="568924"/>
+                    <a:pt x="464762" y="65941"/>
+                    <a:pt x="1060340" y="5457"/>
+                  </a:cubicBezTo>
+                  <a:close/>
+                </a:path>
+              </a:pathLst>
+            </a:custGeom>
+            <a:solidFill>
+              <a:srgbClr val="52CDC0"/>
+            </a:solidFill>
+            <a:ln>
+              <a:noFill/>
+            </a:ln>
+          </p:spPr>
+          <p:style>
+            <a:lnRef idx="2">
+              <a:schemeClr val="accent1">
+                <a:shade val="50000"/>
+              </a:schemeClr>
+            </a:lnRef>
+            <a:fillRef idx="1">
+              <a:schemeClr val="accent1"/>
+            </a:fillRef>
+            <a:effectRef idx="0">
+              <a:schemeClr val="accent1"/>
+            </a:effectRef>
+            <a:fontRef idx="minor">
+              <a:schemeClr val="lt1"/>
+            </a:fontRef>
+          </p:style>
+          <p:txBody>
+            <a:bodyPr rtlCol="0" anchor="ctr"/>
+            <a:lstStyle/>
+            <a:p>
+              <a:pPr algn="ctr"/>
+              <a:endParaRPr lang="en-US" dirty="0"/>
+            </a:p>
+          </p:txBody>
+        </p:sp>
+        <p:sp>
+          <p:nvSpPr>
+            <p:cNvPr id="58" name="TextBox 57">
+              <a:extLst>
+                <a:ext uri="{FF2B5EF4-FFF2-40B4-BE49-F238E27FC236}">
+                  <a16:creationId xmlns:a16="http://schemas.microsoft.com/office/drawing/2014/main" id="{CD6BDC4B-8313-4203-9F42-C28AC214EB64}"/>
+                </a:ext>
+              </a:extLst>
+            </p:cNvPr>
+            <p:cNvSpPr txBox="1"/>
+            <p:nvPr/>
+          </p:nvSpPr>
+          <p:spPr>
+            <a:xfrm rot="16200000">
+              <a:off x="10341391" y="3105834"/>
+              <a:ext cx="1992086" cy="646331"/>
+            </a:xfrm>
+            <a:prstGeom prst="rect">
+              <a:avLst/>
+            </a:prstGeom>
+            <a:noFill/>
+          </p:spPr>
+          <p:txBody>
+            <a:bodyPr wrap="square" rtlCol="0">
+              <a:spAutoFit/>
+            </a:bodyPr>
+            <a:lstStyle/>
+            <a:p>
+              <a:pPr algn="ctr"/>
+              <a:r>
+                <a:rPr lang="en-US" sz="3600" b="1" dirty="0">
+                  <a:solidFill>
+                    <a:srgbClr val="F0EEF0"/>
+                  </a:solidFill>
+                  <a:latin typeface="Tw Cen MT" panose="020B0602020104020603" pitchFamily="34" charset="0"/>
+                </a:rPr>
+                <a:t>content</a:t>
+              </a:r>
+            </a:p>
+          </p:txBody>
+        </p:sp>
+        <p:pic>
+          <p:nvPicPr>
+            <p:cNvPr id="59" name="Picture 58">
+              <a:extLst>
+                <a:ext uri="{FF2B5EF4-FFF2-40B4-BE49-F238E27FC236}">
+                  <a16:creationId xmlns:a16="http://schemas.microsoft.com/office/drawing/2014/main" id="{44037FC5-8E34-4772-9A87-813F2AD5E4D7}"/>
+                </a:ext>
+              </a:extLst>
+            </p:cNvPr>
+            <p:cNvPicPr>
+              <a:picLocks noChangeAspect="1"/>
+            </p:cNvPicPr>
+            <p:nvPr/>
+          </p:nvPicPr>
+          <p:blipFill>
+            <a:blip r:embed="rId3">
+              <a:extLst>
+                <a:ext uri="{28A0092B-C50C-407E-A947-70E740481C1C}">
+                  <a14:useLocalDpi xmlns:a14="http://schemas.microsoft.com/office/drawing/2010/main" val="0"/>
+                </a:ext>
+              </a:extLst>
+            </a:blip>
+            <a:stretch>
+              <a:fillRect/>
+            </a:stretch>
+          </p:blipFill>
+          <p:spPr>
+            <a:xfrm rot="16200000">
+              <a:off x="10600933" y="3247473"/>
+              <a:ext cx="530600" cy="530600"/>
+            </a:xfrm>
+            <a:prstGeom prst="rect">
+              <a:avLst/>
+            </a:prstGeom>
+          </p:spPr>
+        </p:pic>
+      </p:grpSp>
+      <p:grpSp>
+        <p:nvGrpSpPr>
+          <p:cNvPr id="60" name="Group 59">
+            <a:extLst>
+              <a:ext uri="{FF2B5EF4-FFF2-40B4-BE49-F238E27FC236}">
+                <a16:creationId xmlns:a16="http://schemas.microsoft.com/office/drawing/2014/main" id="{BC916508-F80D-434E-B066-812949E5DB94}"/>
+              </a:ext>
+            </a:extLst>
+          </p:cNvPr>
+          <p:cNvGrpSpPr/>
+          <p:nvPr/>
+        </p:nvGrpSpPr>
+        <p:grpSpPr>
+          <a:xfrm>
+            <a:off x="-7847639" y="0"/>
+            <a:ext cx="9961092" cy="6858000"/>
+            <a:chOff x="491575" y="0"/>
+            <a:chExt cx="9961092" cy="6858000"/>
+          </a:xfrm>
+        </p:grpSpPr>
+        <p:sp>
+          <p:nvSpPr>
+            <p:cNvPr id="61" name="Rectangle 60">
+              <a:extLst>
+                <a:ext uri="{FF2B5EF4-FFF2-40B4-BE49-F238E27FC236}">
+                  <a16:creationId xmlns:a16="http://schemas.microsoft.com/office/drawing/2014/main" id="{CE9E3B68-B936-49FB-94D8-7AC0076CF488}"/>
+                </a:ext>
+              </a:extLst>
+            </p:cNvPr>
+            <p:cNvSpPr/>
+            <p:nvPr/>
+          </p:nvSpPr>
+          <p:spPr>
+            <a:xfrm>
+              <a:off x="491575" y="0"/>
+              <a:ext cx="9961092" cy="6858000"/>
+            </a:xfrm>
+            <a:prstGeom prst="rect">
+              <a:avLst/>
+            </a:prstGeom>
+            <a:solidFill>
+              <a:srgbClr val="F0EEF0"/>
+            </a:solidFill>
+            <a:ln>
+              <a:noFill/>
+            </a:ln>
+            <a:effectLst>
+              <a:outerShdw blurRad="215900" dist="38100" sx="101000" sy="101000" algn="l" rotWithShape="0">
+                <a:schemeClr val="tx1">
+                  <a:lumMod val="65000"/>
+                  <a:lumOff val="35000"/>
+                  <a:alpha val="35000"/>
+                </a:schemeClr>
+              </a:outerShdw>
+            </a:effectLst>
+          </p:spPr>
+          <p:style>
+            <a:lnRef idx="2">
+              <a:schemeClr val="accent1">
+                <a:shade val="50000"/>
+              </a:schemeClr>
+            </a:lnRef>
+            <a:fillRef idx="1">
+              <a:schemeClr val="accent1"/>
+            </a:fillRef>
+            <a:effectRef idx="0">
+              <a:schemeClr val="accent1"/>
+            </a:effectRef>
+            <a:fontRef idx="minor">
+              <a:schemeClr val="lt1"/>
+            </a:fontRef>
+          </p:style>
+          <p:txBody>
+            <a:bodyPr rtlCol="0" anchor="ctr"/>
+            <a:lstStyle/>
+            <a:p>
+              <a:pPr algn="ctr"/>
+              <a:endParaRPr lang="en-US"/>
+            </a:p>
+          </p:txBody>
+        </p:sp>
+        <p:sp>
+          <p:nvSpPr>
+            <p:cNvPr id="62" name="Freeform: Shape 61">
+              <a:extLst>
+                <a:ext uri="{FF2B5EF4-FFF2-40B4-BE49-F238E27FC236}">
+                  <a16:creationId xmlns:a16="http://schemas.microsoft.com/office/drawing/2014/main" id="{0D3F9516-66C4-44E6-9877-6C0374B5112C}"/>
+                </a:ext>
+              </a:extLst>
+            </p:cNvPr>
+            <p:cNvSpPr/>
+            <p:nvPr/>
+          </p:nvSpPr>
+          <p:spPr>
+            <a:xfrm>
+              <a:off x="9284267" y="2337440"/>
+              <a:ext cx="1168400" cy="2360918"/>
+            </a:xfrm>
+            <a:custGeom>
+              <a:avLst/>
+              <a:gdLst>
+                <a:gd name="connsiteX0" fmla="*/ 1168400 w 1168400"/>
+                <a:gd name="connsiteY0" fmla="*/ 0 h 2360918"/>
+                <a:gd name="connsiteX1" fmla="*/ 1168400 w 1168400"/>
+                <a:gd name="connsiteY1" fmla="*/ 2360918 h 2360918"/>
+                <a:gd name="connsiteX2" fmla="*/ 1060340 w 1168400"/>
+                <a:gd name="connsiteY2" fmla="*/ 2355461 h 2360918"/>
+                <a:gd name="connsiteX3" fmla="*/ 0 w 1168400"/>
+                <a:gd name="connsiteY3" fmla="*/ 1180459 h 2360918"/>
+                <a:gd name="connsiteX4" fmla="*/ 1060340 w 1168400"/>
+                <a:gd name="connsiteY4" fmla="*/ 5457 h 2360918"/>
+              </a:gdLst>
+              <a:ahLst/>
+              <a:cxnLst>
+                <a:cxn ang="0">
+                  <a:pos x="connsiteX0" y="connsiteY0"/>
+                </a:cxn>
+                <a:cxn ang="0">
+                  <a:pos x="connsiteX1" y="connsiteY1"/>
+                </a:cxn>
+                <a:cxn ang="0">
+                  <a:pos x="connsiteX2" y="connsiteY2"/>
+                </a:cxn>
+                <a:cxn ang="0">
+                  <a:pos x="connsiteX3" y="connsiteY3"/>
+                </a:cxn>
+                <a:cxn ang="0">
+                  <a:pos x="connsiteX4" y="connsiteY4"/>
+                </a:cxn>
+              </a:cxnLst>
+              <a:rect l="l" t="t" r="r" b="b"/>
+              <a:pathLst>
+                <a:path w="1168400" h="2360918">
+                  <a:moveTo>
+                    <a:pt x="1168400" y="0"/>
+                  </a:moveTo>
+                  <a:lnTo>
+                    <a:pt x="1168400" y="2360918"/>
+                  </a:lnTo>
+                  <a:lnTo>
+                    <a:pt x="1060340" y="2355461"/>
+                  </a:lnTo>
+                  <a:cubicBezTo>
+                    <a:pt x="464762" y="2294977"/>
+                    <a:pt x="0" y="1791994"/>
+                    <a:pt x="0" y="1180459"/>
+                  </a:cubicBezTo>
+                  <a:cubicBezTo>
+                    <a:pt x="0" y="568924"/>
+                    <a:pt x="464762" y="65941"/>
+                    <a:pt x="1060340" y="5457"/>
+                  </a:cubicBezTo>
+                  <a:close/>
+                </a:path>
+              </a:pathLst>
+            </a:custGeom>
+            <a:solidFill>
+              <a:srgbClr val="FFC730"/>
+            </a:solidFill>
+            <a:ln>
+              <a:noFill/>
+            </a:ln>
+          </p:spPr>
+          <p:style>
+            <a:lnRef idx="2">
+              <a:schemeClr val="accent1">
+                <a:shade val="50000"/>
+              </a:schemeClr>
+            </a:lnRef>
+            <a:fillRef idx="1">
+              <a:schemeClr val="accent1"/>
+            </a:fillRef>
+            <a:effectRef idx="0">
+              <a:schemeClr val="accent1"/>
+            </a:effectRef>
+            <a:fontRef idx="minor">
+              <a:schemeClr val="lt1"/>
+            </a:fontRef>
+          </p:style>
+          <p:txBody>
+            <a:bodyPr rtlCol="0" anchor="ctr"/>
+            <a:lstStyle/>
+            <a:p>
+              <a:pPr algn="ctr"/>
+              <a:endParaRPr lang="en-US" dirty="0"/>
+            </a:p>
+          </p:txBody>
+        </p:sp>
+        <p:sp>
+          <p:nvSpPr>
+            <p:cNvPr id="63" name="TextBox 62">
+              <a:extLst>
+                <a:ext uri="{FF2B5EF4-FFF2-40B4-BE49-F238E27FC236}">
+                  <a16:creationId xmlns:a16="http://schemas.microsoft.com/office/drawing/2014/main" id="{32DF4D80-460D-4455-B80A-3BC0C6A12DA2}"/>
+                </a:ext>
+              </a:extLst>
+            </p:cNvPr>
+            <p:cNvSpPr txBox="1"/>
+            <p:nvPr/>
+          </p:nvSpPr>
+          <p:spPr>
+            <a:xfrm rot="16200000">
+              <a:off x="9117129" y="3189611"/>
+              <a:ext cx="1992086" cy="646331"/>
+            </a:xfrm>
+            <a:prstGeom prst="rect">
+              <a:avLst/>
+            </a:prstGeom>
+            <a:noFill/>
+          </p:spPr>
+          <p:txBody>
+            <a:bodyPr wrap="square" rtlCol="0">
+              <a:spAutoFit/>
+            </a:bodyPr>
+            <a:lstStyle/>
+            <a:p>
+              <a:pPr algn="ctr"/>
+              <a:r>
+                <a:rPr lang="en-US" sz="3600" b="1" dirty="0">
+                  <a:solidFill>
+                    <a:srgbClr val="F0EEF0"/>
+                  </a:solidFill>
+                  <a:latin typeface="Tw Cen MT" panose="020B0602020104020603" pitchFamily="34" charset="0"/>
+                </a:rPr>
+                <a:t>grades</a:t>
+              </a:r>
+            </a:p>
+          </p:txBody>
+        </p:sp>
+        <p:pic>
+          <p:nvPicPr>
+            <p:cNvPr id="64" name="Picture 63">
+              <a:extLst>
+                <a:ext uri="{FF2B5EF4-FFF2-40B4-BE49-F238E27FC236}">
+                  <a16:creationId xmlns:a16="http://schemas.microsoft.com/office/drawing/2014/main" id="{7AB39DAF-3109-4CEA-BD1D-C123179FF81F}"/>
+                </a:ext>
+              </a:extLst>
+            </p:cNvPr>
+            <p:cNvPicPr>
+              <a:picLocks noChangeAspect="1"/>
+            </p:cNvPicPr>
+            <p:nvPr/>
+          </p:nvPicPr>
+          <p:blipFill>
+            <a:blip r:embed="rId3">
+              <a:extLst>
+                <a:ext uri="{28A0092B-C50C-407E-A947-70E740481C1C}">
+                  <a14:useLocalDpi xmlns:a14="http://schemas.microsoft.com/office/drawing/2010/main" val="0"/>
+                </a:ext>
+              </a:extLst>
+            </a:blip>
+            <a:stretch>
+              <a:fillRect/>
+            </a:stretch>
+          </p:blipFill>
+          <p:spPr>
+            <a:xfrm rot="16200000">
+              <a:off x="9385467" y="3247473"/>
+              <a:ext cx="530600" cy="530600"/>
+            </a:xfrm>
+            <a:prstGeom prst="rect">
+              <a:avLst/>
+            </a:prstGeom>
+          </p:spPr>
+        </p:pic>
+      </p:grpSp>
+      <p:grpSp>
+        <p:nvGrpSpPr>
+          <p:cNvPr id="65" name="Group 64">
+            <a:extLst>
+              <a:ext uri="{FF2B5EF4-FFF2-40B4-BE49-F238E27FC236}">
+                <a16:creationId xmlns:a16="http://schemas.microsoft.com/office/drawing/2014/main" id="{92B7020D-701A-4EE7-BDA2-CD171993C203}"/>
+              </a:ext>
+            </a:extLst>
+          </p:cNvPr>
+          <p:cNvGrpSpPr/>
+          <p:nvPr/>
+        </p:nvGrpSpPr>
+        <p:grpSpPr>
+          <a:xfrm>
+            <a:off x="-7985197" y="0"/>
+            <a:ext cx="9574094" cy="6858000"/>
+            <a:chOff x="491575" y="0"/>
+            <a:chExt cx="9574094" cy="6858000"/>
+          </a:xfrm>
+        </p:grpSpPr>
+        <p:sp>
+          <p:nvSpPr>
+            <p:cNvPr id="66" name="Rectangle 65">
+              <a:extLst>
+                <a:ext uri="{FF2B5EF4-FFF2-40B4-BE49-F238E27FC236}">
+                  <a16:creationId xmlns:a16="http://schemas.microsoft.com/office/drawing/2014/main" id="{3B77930A-0489-40A5-B3D7-053D64BD29C4}"/>
+                </a:ext>
+              </a:extLst>
+            </p:cNvPr>
+            <p:cNvSpPr/>
+            <p:nvPr/>
+          </p:nvSpPr>
+          <p:spPr>
+            <a:xfrm>
+              <a:off x="491575" y="0"/>
+              <a:ext cx="9574094" cy="6858000"/>
+            </a:xfrm>
+            <a:prstGeom prst="rect">
+              <a:avLst/>
+            </a:prstGeom>
+            <a:solidFill>
+              <a:srgbClr val="F0EEF0"/>
+            </a:solidFill>
+            <a:ln>
+              <a:noFill/>
+            </a:ln>
+            <a:effectLst>
+              <a:outerShdw blurRad="215900" dist="38100" sx="101000" sy="101000" algn="l" rotWithShape="0">
+                <a:schemeClr val="tx1">
+                  <a:lumMod val="65000"/>
+                  <a:lumOff val="35000"/>
+                  <a:alpha val="35000"/>
+                </a:schemeClr>
+              </a:outerShdw>
+            </a:effectLst>
+          </p:spPr>
+          <p:style>
+            <a:lnRef idx="2">
+              <a:schemeClr val="accent1">
+                <a:shade val="50000"/>
+              </a:schemeClr>
+            </a:lnRef>
+            <a:fillRef idx="1">
+              <a:schemeClr val="accent1"/>
+            </a:fillRef>
+            <a:effectRef idx="0">
+              <a:schemeClr val="accent1"/>
+            </a:effectRef>
+            <a:fontRef idx="minor">
+              <a:schemeClr val="lt1"/>
+            </a:fontRef>
+          </p:style>
+          <p:txBody>
+            <a:bodyPr rtlCol="0" anchor="ctr"/>
+            <a:lstStyle/>
+            <a:p>
+              <a:pPr algn="ctr"/>
+              <a:endParaRPr lang="en-US"/>
+            </a:p>
+          </p:txBody>
+        </p:sp>
+        <p:sp>
+          <p:nvSpPr>
+            <p:cNvPr id="67" name="Freeform: Shape 66">
+              <a:extLst>
+                <a:ext uri="{FF2B5EF4-FFF2-40B4-BE49-F238E27FC236}">
+                  <a16:creationId xmlns:a16="http://schemas.microsoft.com/office/drawing/2014/main" id="{3ED749F6-F5EB-48BD-A697-16D473CCCFE8}"/>
+                </a:ext>
+              </a:extLst>
+            </p:cNvPr>
+            <p:cNvSpPr/>
+            <p:nvPr/>
+          </p:nvSpPr>
+          <p:spPr>
+            <a:xfrm>
+              <a:off x="8897260" y="2337440"/>
+              <a:ext cx="1168400" cy="2360918"/>
+            </a:xfrm>
+            <a:custGeom>
+              <a:avLst/>
+              <a:gdLst>
+                <a:gd name="connsiteX0" fmla="*/ 1168400 w 1168400"/>
+                <a:gd name="connsiteY0" fmla="*/ 0 h 2360918"/>
+                <a:gd name="connsiteX1" fmla="*/ 1168400 w 1168400"/>
+                <a:gd name="connsiteY1" fmla="*/ 2360918 h 2360918"/>
+                <a:gd name="connsiteX2" fmla="*/ 1060340 w 1168400"/>
+                <a:gd name="connsiteY2" fmla="*/ 2355461 h 2360918"/>
+                <a:gd name="connsiteX3" fmla="*/ 0 w 1168400"/>
+                <a:gd name="connsiteY3" fmla="*/ 1180459 h 2360918"/>
+                <a:gd name="connsiteX4" fmla="*/ 1060340 w 1168400"/>
+                <a:gd name="connsiteY4" fmla="*/ 5457 h 2360918"/>
+              </a:gdLst>
+              <a:ahLst/>
+              <a:cxnLst>
+                <a:cxn ang="0">
+                  <a:pos x="connsiteX0" y="connsiteY0"/>
+                </a:cxn>
+                <a:cxn ang="0">
+                  <a:pos x="connsiteX1" y="connsiteY1"/>
+                </a:cxn>
+                <a:cxn ang="0">
+                  <a:pos x="connsiteX2" y="connsiteY2"/>
+                </a:cxn>
+                <a:cxn ang="0">
+                  <a:pos x="connsiteX3" y="connsiteY3"/>
+                </a:cxn>
+                <a:cxn ang="0">
+                  <a:pos x="connsiteX4" y="connsiteY4"/>
+                </a:cxn>
+              </a:cxnLst>
+              <a:rect l="l" t="t" r="r" b="b"/>
+              <a:pathLst>
+                <a:path w="1168400" h="2360918">
+                  <a:moveTo>
+                    <a:pt x="1168400" y="0"/>
+                  </a:moveTo>
+                  <a:lnTo>
+                    <a:pt x="1168400" y="2360918"/>
+                  </a:lnTo>
+                  <a:lnTo>
+                    <a:pt x="1060340" y="2355461"/>
+                  </a:lnTo>
+                  <a:cubicBezTo>
+                    <a:pt x="464762" y="2294977"/>
+                    <a:pt x="0" y="1791994"/>
+                    <a:pt x="0" y="1180459"/>
+                  </a:cubicBezTo>
+                  <a:cubicBezTo>
+                    <a:pt x="0" y="568924"/>
+                    <a:pt x="464762" y="65941"/>
+                    <a:pt x="1060340" y="5457"/>
+                  </a:cubicBezTo>
+                  <a:close/>
+                </a:path>
+              </a:pathLst>
+            </a:custGeom>
+            <a:solidFill>
+              <a:srgbClr val="5D7373"/>
+            </a:solidFill>
+            <a:ln>
+              <a:noFill/>
+            </a:ln>
+          </p:spPr>
+          <p:style>
+            <a:lnRef idx="2">
+              <a:schemeClr val="accent1">
+                <a:shade val="50000"/>
+              </a:schemeClr>
+            </a:lnRef>
+            <a:fillRef idx="1">
+              <a:schemeClr val="accent1"/>
+            </a:fillRef>
+            <a:effectRef idx="0">
+              <a:schemeClr val="accent1"/>
+            </a:effectRef>
+            <a:fontRef idx="minor">
+              <a:schemeClr val="lt1"/>
+            </a:fontRef>
+          </p:style>
+          <p:txBody>
+            <a:bodyPr rtlCol="0" anchor="ctr"/>
+            <a:lstStyle/>
+            <a:p>
+              <a:pPr algn="ctr"/>
+              <a:endParaRPr lang="en-US" dirty="0"/>
+            </a:p>
+          </p:txBody>
+        </p:sp>
+        <p:sp>
+          <p:nvSpPr>
+            <p:cNvPr id="68" name="TextBox 67">
+              <a:extLst>
+                <a:ext uri="{FF2B5EF4-FFF2-40B4-BE49-F238E27FC236}">
+                  <a16:creationId xmlns:a16="http://schemas.microsoft.com/office/drawing/2014/main" id="{8070AD46-78F1-4169-9AE3-EDECC43BD39B}"/>
+                </a:ext>
+              </a:extLst>
+            </p:cNvPr>
+            <p:cNvSpPr txBox="1"/>
+            <p:nvPr/>
+          </p:nvSpPr>
+          <p:spPr>
+            <a:xfrm rot="16200000">
+              <a:off x="8746452" y="3189607"/>
+              <a:ext cx="1992086" cy="646331"/>
+            </a:xfrm>
+            <a:prstGeom prst="rect">
+              <a:avLst/>
+            </a:prstGeom>
+            <a:noFill/>
+          </p:spPr>
+          <p:txBody>
+            <a:bodyPr wrap="square" rtlCol="0">
+              <a:spAutoFit/>
+            </a:bodyPr>
+            <a:lstStyle/>
+            <a:p>
+              <a:pPr algn="ctr"/>
+              <a:r>
+                <a:rPr lang="en-US" sz="3600" b="1" dirty="0" err="1">
+                  <a:solidFill>
+                    <a:srgbClr val="F0EEF0"/>
+                  </a:solidFill>
+                  <a:latin typeface="Tw Cen MT" panose="020B0602020104020603" pitchFamily="34" charset="0"/>
+                </a:rPr>
+                <a:t>temas</a:t>
+              </a:r>
+              <a:endParaRPr lang="en-US" sz="3600" b="1" dirty="0">
+                <a:solidFill>
+                  <a:srgbClr val="F0EEF0"/>
+                </a:solidFill>
+                <a:latin typeface="Tw Cen MT" panose="020B0602020104020603" pitchFamily="34" charset="0"/>
+              </a:endParaRPr>
+            </a:p>
+          </p:txBody>
+        </p:sp>
+        <p:pic>
+          <p:nvPicPr>
+            <p:cNvPr id="69" name="Picture 68">
+              <a:extLst>
+                <a:ext uri="{FF2B5EF4-FFF2-40B4-BE49-F238E27FC236}">
+                  <a16:creationId xmlns:a16="http://schemas.microsoft.com/office/drawing/2014/main" id="{22B026A5-B1AC-46D4-AE84-DF77E5A294CF}"/>
+                </a:ext>
+              </a:extLst>
+            </p:cNvPr>
+            <p:cNvPicPr>
+              <a:picLocks noChangeAspect="1"/>
+            </p:cNvPicPr>
+            <p:nvPr/>
+          </p:nvPicPr>
+          <p:blipFill>
+            <a:blip r:embed="rId3">
+              <a:extLst>
+                <a:ext uri="{28A0092B-C50C-407E-A947-70E740481C1C}">
+                  <a14:useLocalDpi xmlns:a14="http://schemas.microsoft.com/office/drawing/2010/main" val="0"/>
+                </a:ext>
+              </a:extLst>
+            </a:blip>
+            <a:stretch>
+              <a:fillRect/>
+            </a:stretch>
+          </p:blipFill>
+          <p:spPr>
+            <a:xfrm rot="16200000">
+              <a:off x="8992269" y="3247473"/>
+              <a:ext cx="530600" cy="530600"/>
+            </a:xfrm>
+            <a:prstGeom prst="rect">
+              <a:avLst/>
+            </a:prstGeom>
+          </p:spPr>
+        </p:pic>
+      </p:grpSp>
+      <p:sp>
+        <p:nvSpPr>
+          <p:cNvPr id="70" name="Rectangle 69">
+            <a:extLst>
+              <a:ext uri="{FF2B5EF4-FFF2-40B4-BE49-F238E27FC236}">
+                <a16:creationId xmlns:a16="http://schemas.microsoft.com/office/drawing/2014/main" id="{371C6EE2-CCA6-4F94-870B-CB9D61CEBE17}"/>
+              </a:ext>
+            </a:extLst>
+          </p:cNvPr>
+          <p:cNvSpPr/>
+          <p:nvPr/>
+        </p:nvSpPr>
+        <p:spPr>
+          <a:xfrm>
+            <a:off x="-7962177" y="-1"/>
+            <a:ext cx="5781368" cy="6858000"/>
+          </a:xfrm>
+          <a:prstGeom prst="rect">
+            <a:avLst/>
+          </a:prstGeom>
+          <a:solidFill>
+            <a:srgbClr val="F0EEF0"/>
+          </a:solidFill>
+          <a:ln>
+            <a:noFill/>
+          </a:ln>
+          <a:effectLst>
+            <a:outerShdw blurRad="215900" dist="38100" sx="101000" sy="101000" algn="l" rotWithShape="0">
+              <a:schemeClr val="tx1">
+                <a:lumMod val="65000"/>
+                <a:lumOff val="35000"/>
+                <a:alpha val="35000"/>
+              </a:schemeClr>
+            </a:outerShdw>
+          </a:effectLst>
+        </p:spPr>
+        <p:style>
+          <a:lnRef idx="2">
+            <a:schemeClr val="accent1">
+              <a:shade val="50000"/>
+            </a:schemeClr>
+          </a:lnRef>
+          <a:fillRef idx="1">
+            <a:schemeClr val="accent1"/>
+          </a:fillRef>
+          <a:effectRef idx="0">
+            <a:schemeClr val="accent1"/>
+          </a:effectRef>
+          <a:fontRef idx="minor">
+            <a:schemeClr val="lt1"/>
+          </a:fontRef>
+        </p:style>
+        <p:txBody>
+          <a:bodyPr rtlCol="0" anchor="ctr"/>
+          <a:lstStyle/>
+          <a:p>
+            <a:pPr algn="ctr"/>
+            <a:endParaRPr lang="en-US"/>
+          </a:p>
+        </p:txBody>
+      </p:sp>
+      <p:grpSp>
+        <p:nvGrpSpPr>
+          <p:cNvPr id="71" name="Group 70">
+            <a:extLst>
+              <a:ext uri="{FF2B5EF4-FFF2-40B4-BE49-F238E27FC236}">
+                <a16:creationId xmlns:a16="http://schemas.microsoft.com/office/drawing/2014/main" id="{20422D8F-B19E-425C-93A8-F750F60A06A7}"/>
+              </a:ext>
+            </a:extLst>
+          </p:cNvPr>
+          <p:cNvGrpSpPr/>
+          <p:nvPr/>
+        </p:nvGrpSpPr>
+        <p:grpSpPr>
+          <a:xfrm>
+            <a:off x="-7638543" y="-1"/>
+            <a:ext cx="8692332" cy="6858000"/>
+            <a:chOff x="718505" y="-1"/>
+            <a:chExt cx="8692332" cy="6858000"/>
+          </a:xfrm>
+        </p:grpSpPr>
+        <p:sp>
+          <p:nvSpPr>
+            <p:cNvPr id="72" name="Rectangle 71">
+              <a:extLst>
+                <a:ext uri="{FF2B5EF4-FFF2-40B4-BE49-F238E27FC236}">
+                  <a16:creationId xmlns:a16="http://schemas.microsoft.com/office/drawing/2014/main" id="{3278AF09-2D0C-4E81-816C-BC1D04E40DC2}"/>
+                </a:ext>
+              </a:extLst>
+            </p:cNvPr>
+            <p:cNvSpPr/>
+            <p:nvPr/>
+          </p:nvSpPr>
+          <p:spPr>
+            <a:xfrm>
+              <a:off x="718505" y="-1"/>
+              <a:ext cx="8692331" cy="6858000"/>
+            </a:xfrm>
+            <a:prstGeom prst="rect">
+              <a:avLst/>
+            </a:prstGeom>
+            <a:solidFill>
+              <a:srgbClr val="F0EEF0"/>
+            </a:solidFill>
+            <a:ln>
+              <a:noFill/>
+            </a:ln>
+            <a:effectLst>
+              <a:outerShdw blurRad="215900" dist="38100" sx="101000" sy="101000" algn="l" rotWithShape="0">
+                <a:schemeClr val="tx1">
+                  <a:lumMod val="65000"/>
+                  <a:lumOff val="35000"/>
+                  <a:alpha val="35000"/>
+                </a:schemeClr>
+              </a:outerShdw>
+            </a:effectLst>
+          </p:spPr>
+          <p:style>
+            <a:lnRef idx="2">
+              <a:schemeClr val="accent1">
+                <a:shade val="50000"/>
+              </a:schemeClr>
+            </a:lnRef>
+            <a:fillRef idx="1">
+              <a:schemeClr val="accent1"/>
+            </a:fillRef>
+            <a:effectRef idx="0">
+              <a:schemeClr val="accent1"/>
+            </a:effectRef>
+            <a:fontRef idx="minor">
+              <a:schemeClr val="lt1"/>
+            </a:fontRef>
+          </p:style>
+          <p:txBody>
+            <a:bodyPr rtlCol="0" anchor="ctr"/>
+            <a:lstStyle/>
+            <a:p>
+              <a:pPr algn="ctr"/>
+              <a:endParaRPr lang="en-US"/>
+            </a:p>
+          </p:txBody>
+        </p:sp>
+        <p:sp>
+          <p:nvSpPr>
+            <p:cNvPr id="73" name="Freeform: Shape 72">
+              <a:extLst>
+                <a:ext uri="{FF2B5EF4-FFF2-40B4-BE49-F238E27FC236}">
+                  <a16:creationId xmlns:a16="http://schemas.microsoft.com/office/drawing/2014/main" id="{AC2E1C67-7A8F-4EB5-AB00-3C754858084E}"/>
+                </a:ext>
+              </a:extLst>
+            </p:cNvPr>
+            <p:cNvSpPr/>
+            <p:nvPr/>
+          </p:nvSpPr>
+          <p:spPr>
+            <a:xfrm>
+              <a:off x="8242436" y="2337439"/>
+              <a:ext cx="1168400" cy="2360918"/>
+            </a:xfrm>
+            <a:custGeom>
+              <a:avLst/>
+              <a:gdLst>
+                <a:gd name="connsiteX0" fmla="*/ 1168400 w 1168400"/>
+                <a:gd name="connsiteY0" fmla="*/ 0 h 2360918"/>
+                <a:gd name="connsiteX1" fmla="*/ 1168400 w 1168400"/>
+                <a:gd name="connsiteY1" fmla="*/ 2360918 h 2360918"/>
+                <a:gd name="connsiteX2" fmla="*/ 1060340 w 1168400"/>
+                <a:gd name="connsiteY2" fmla="*/ 2355461 h 2360918"/>
+                <a:gd name="connsiteX3" fmla="*/ 0 w 1168400"/>
+                <a:gd name="connsiteY3" fmla="*/ 1180459 h 2360918"/>
+                <a:gd name="connsiteX4" fmla="*/ 1060340 w 1168400"/>
+                <a:gd name="connsiteY4" fmla="*/ 5457 h 2360918"/>
+              </a:gdLst>
+              <a:ahLst/>
+              <a:cxnLst>
+                <a:cxn ang="0">
+                  <a:pos x="connsiteX0" y="connsiteY0"/>
+                </a:cxn>
+                <a:cxn ang="0">
+                  <a:pos x="connsiteX1" y="connsiteY1"/>
+                </a:cxn>
+                <a:cxn ang="0">
+                  <a:pos x="connsiteX2" y="connsiteY2"/>
+                </a:cxn>
+                <a:cxn ang="0">
+                  <a:pos x="connsiteX3" y="connsiteY3"/>
+                </a:cxn>
+                <a:cxn ang="0">
+                  <a:pos x="connsiteX4" y="connsiteY4"/>
+                </a:cxn>
+              </a:cxnLst>
+              <a:rect l="l" t="t" r="r" b="b"/>
+              <a:pathLst>
+                <a:path w="1168400" h="2360918">
+                  <a:moveTo>
+                    <a:pt x="1168400" y="0"/>
+                  </a:moveTo>
+                  <a:lnTo>
+                    <a:pt x="1168400" y="2360918"/>
+                  </a:lnTo>
+                  <a:lnTo>
+                    <a:pt x="1060340" y="2355461"/>
+                  </a:lnTo>
+                  <a:cubicBezTo>
+                    <a:pt x="464762" y="2294977"/>
+                    <a:pt x="0" y="1791994"/>
+                    <a:pt x="0" y="1180459"/>
+                  </a:cubicBezTo>
+                  <a:cubicBezTo>
+                    <a:pt x="0" y="568924"/>
+                    <a:pt x="464762" y="65941"/>
+                    <a:pt x="1060340" y="5457"/>
+                  </a:cubicBezTo>
+                  <a:close/>
+                </a:path>
+              </a:pathLst>
+            </a:custGeom>
+            <a:solidFill>
+              <a:srgbClr val="92D050"/>
+            </a:solidFill>
+            <a:ln>
+              <a:noFill/>
+            </a:ln>
+          </p:spPr>
+          <p:style>
+            <a:lnRef idx="2">
+              <a:schemeClr val="accent1">
+                <a:shade val="50000"/>
+              </a:schemeClr>
+            </a:lnRef>
+            <a:fillRef idx="1">
+              <a:schemeClr val="accent1"/>
+            </a:fillRef>
+            <a:effectRef idx="0">
+              <a:schemeClr val="accent1"/>
+            </a:effectRef>
+            <a:fontRef idx="minor">
+              <a:schemeClr val="lt1"/>
+            </a:fontRef>
+          </p:style>
+          <p:txBody>
+            <a:bodyPr rtlCol="0" anchor="ctr"/>
+            <a:lstStyle/>
+            <a:p>
+              <a:pPr algn="ctr"/>
+              <a:endParaRPr lang="en-US" dirty="0"/>
+            </a:p>
+          </p:txBody>
+        </p:sp>
+        <p:sp>
+          <p:nvSpPr>
+            <p:cNvPr id="74" name="TextBox 73">
+              <a:extLst>
+                <a:ext uri="{FF2B5EF4-FFF2-40B4-BE49-F238E27FC236}">
+                  <a16:creationId xmlns:a16="http://schemas.microsoft.com/office/drawing/2014/main" id="{67795C74-0308-4781-BEE6-B62AE6D17152}"/>
+                </a:ext>
+              </a:extLst>
+            </p:cNvPr>
+            <p:cNvSpPr txBox="1"/>
+            <p:nvPr/>
+          </p:nvSpPr>
+          <p:spPr>
+            <a:xfrm rot="16200000">
+              <a:off x="8091629" y="3189609"/>
+              <a:ext cx="1992086" cy="646331"/>
+            </a:xfrm>
+            <a:prstGeom prst="rect">
+              <a:avLst/>
+            </a:prstGeom>
+            <a:noFill/>
+          </p:spPr>
+          <p:txBody>
+            <a:bodyPr wrap="square" rtlCol="0">
+              <a:spAutoFit/>
+            </a:bodyPr>
+            <a:lstStyle/>
+            <a:p>
+              <a:pPr algn="ctr"/>
+              <a:r>
+                <a:rPr lang="en-US" sz="3600" b="1" dirty="0" err="1">
+                  <a:solidFill>
+                    <a:srgbClr val="F0EEF0"/>
+                  </a:solidFill>
+                  <a:latin typeface="Tw Cen MT" panose="020B0602020104020603" pitchFamily="34" charset="0"/>
+                </a:rPr>
+                <a:t>fechas</a:t>
+              </a:r>
+              <a:endParaRPr lang="en-US" sz="3600" b="1" dirty="0">
+                <a:solidFill>
+                  <a:srgbClr val="F0EEF0"/>
+                </a:solidFill>
+                <a:latin typeface="Tw Cen MT" panose="020B0602020104020603" pitchFamily="34" charset="0"/>
+              </a:endParaRPr>
+            </a:p>
+          </p:txBody>
+        </p:sp>
+        <p:pic>
+          <p:nvPicPr>
+            <p:cNvPr id="75" name="Picture 74">
+              <a:extLst>
+                <a:ext uri="{FF2B5EF4-FFF2-40B4-BE49-F238E27FC236}">
+                  <a16:creationId xmlns:a16="http://schemas.microsoft.com/office/drawing/2014/main" id="{45C46027-B464-4ADA-A3B8-14FF4471BA1E}"/>
+                </a:ext>
+              </a:extLst>
+            </p:cNvPr>
+            <p:cNvPicPr>
+              <a:picLocks noChangeAspect="1"/>
+            </p:cNvPicPr>
+            <p:nvPr/>
+          </p:nvPicPr>
+          <p:blipFill>
+            <a:blip r:embed="rId3">
+              <a:extLst>
+                <a:ext uri="{28A0092B-C50C-407E-A947-70E740481C1C}">
+                  <a14:useLocalDpi xmlns:a14="http://schemas.microsoft.com/office/drawing/2010/main" val="0"/>
+                </a:ext>
+              </a:extLst>
+            </a:blip>
+            <a:stretch>
+              <a:fillRect/>
+            </a:stretch>
+          </p:blipFill>
+          <p:spPr>
+            <a:xfrm rot="16200000">
+              <a:off x="8340472" y="3247473"/>
+              <a:ext cx="530600" cy="530600"/>
+            </a:xfrm>
+            <a:prstGeom prst="rect">
+              <a:avLst/>
+            </a:prstGeom>
+          </p:spPr>
+        </p:pic>
+      </p:grpSp>
+      <p:grpSp>
+        <p:nvGrpSpPr>
+          <p:cNvPr id="76" name="Group 75">
+            <a:extLst>
+              <a:ext uri="{FF2B5EF4-FFF2-40B4-BE49-F238E27FC236}">
+                <a16:creationId xmlns:a16="http://schemas.microsoft.com/office/drawing/2014/main" id="{C1D48DDF-B760-4AB3-A520-29238CC2C408}"/>
+              </a:ext>
+            </a:extLst>
+          </p:cNvPr>
+          <p:cNvGrpSpPr/>
+          <p:nvPr/>
+        </p:nvGrpSpPr>
+        <p:grpSpPr>
+          <a:xfrm>
+            <a:off x="-9395082" y="-1"/>
+            <a:ext cx="9927504" cy="6858000"/>
+            <a:chOff x="-9337032" y="-1"/>
+            <a:chExt cx="9927504" cy="6858000"/>
+          </a:xfrm>
+        </p:grpSpPr>
+        <p:sp>
+          <p:nvSpPr>
+            <p:cNvPr id="77" name="Rectangle 76">
+              <a:extLst>
+                <a:ext uri="{FF2B5EF4-FFF2-40B4-BE49-F238E27FC236}">
+                  <a16:creationId xmlns:a16="http://schemas.microsoft.com/office/drawing/2014/main" id="{FA696B4D-5BCF-47C3-8B8C-BE87154A63B4}"/>
+                </a:ext>
+              </a:extLst>
+            </p:cNvPr>
+            <p:cNvSpPr/>
+            <p:nvPr/>
+          </p:nvSpPr>
+          <p:spPr>
+            <a:xfrm>
+              <a:off x="-9337032" y="-1"/>
+              <a:ext cx="9923504" cy="6858000"/>
+            </a:xfrm>
+            <a:prstGeom prst="rect">
+              <a:avLst/>
+            </a:prstGeom>
+            <a:solidFill>
+              <a:srgbClr val="F0EEF0"/>
+            </a:solidFill>
+            <a:ln>
+              <a:noFill/>
+            </a:ln>
+            <a:effectLst>
+              <a:outerShdw blurRad="215900" dist="38100" sx="101000" sy="101000" algn="l" rotWithShape="0">
+                <a:schemeClr val="tx1">
+                  <a:lumMod val="65000"/>
+                  <a:lumOff val="35000"/>
+                  <a:alpha val="35000"/>
+                </a:schemeClr>
+              </a:outerShdw>
+            </a:effectLst>
+          </p:spPr>
+          <p:style>
+            <a:lnRef idx="2">
+              <a:schemeClr val="accent1">
+                <a:shade val="50000"/>
+              </a:schemeClr>
+            </a:lnRef>
+            <a:fillRef idx="1">
+              <a:schemeClr val="accent1"/>
+            </a:fillRef>
+            <a:effectRef idx="0">
+              <a:schemeClr val="accent1"/>
+            </a:effectRef>
+            <a:fontRef idx="minor">
+              <a:schemeClr val="lt1"/>
+            </a:fontRef>
+          </p:style>
+          <p:txBody>
+            <a:bodyPr rtlCol="0" anchor="ctr"/>
+            <a:lstStyle/>
+            <a:p>
+              <a:pPr algn="ctr"/>
+              <a:endParaRPr lang="en-US" dirty="0"/>
+            </a:p>
+          </p:txBody>
+        </p:sp>
+        <p:sp>
+          <p:nvSpPr>
+            <p:cNvPr id="78" name="Freeform: Shape 77">
+              <a:extLst>
+                <a:ext uri="{FF2B5EF4-FFF2-40B4-BE49-F238E27FC236}">
+                  <a16:creationId xmlns:a16="http://schemas.microsoft.com/office/drawing/2014/main" id="{BAAA7B45-7DAF-4C4D-A930-ABA45AC955DD}"/>
+                </a:ext>
+              </a:extLst>
+            </p:cNvPr>
+            <p:cNvSpPr/>
+            <p:nvPr/>
+          </p:nvSpPr>
+          <p:spPr>
+            <a:xfrm>
+              <a:off x="-577928" y="2337438"/>
+              <a:ext cx="1168400" cy="2360918"/>
+            </a:xfrm>
+            <a:custGeom>
+              <a:avLst/>
+              <a:gdLst>
+                <a:gd name="connsiteX0" fmla="*/ 1168400 w 1168400"/>
+                <a:gd name="connsiteY0" fmla="*/ 0 h 2360918"/>
+                <a:gd name="connsiteX1" fmla="*/ 1168400 w 1168400"/>
+                <a:gd name="connsiteY1" fmla="*/ 2360918 h 2360918"/>
+                <a:gd name="connsiteX2" fmla="*/ 1060340 w 1168400"/>
+                <a:gd name="connsiteY2" fmla="*/ 2355461 h 2360918"/>
+                <a:gd name="connsiteX3" fmla="*/ 0 w 1168400"/>
+                <a:gd name="connsiteY3" fmla="*/ 1180459 h 2360918"/>
+                <a:gd name="connsiteX4" fmla="*/ 1060340 w 1168400"/>
+                <a:gd name="connsiteY4" fmla="*/ 5457 h 2360918"/>
+              </a:gdLst>
+              <a:ahLst/>
+              <a:cxnLst>
+                <a:cxn ang="0">
+                  <a:pos x="connsiteX0" y="connsiteY0"/>
+                </a:cxn>
+                <a:cxn ang="0">
+                  <a:pos x="connsiteX1" y="connsiteY1"/>
+                </a:cxn>
+                <a:cxn ang="0">
+                  <a:pos x="connsiteX2" y="connsiteY2"/>
+                </a:cxn>
+                <a:cxn ang="0">
+                  <a:pos x="connsiteX3" y="connsiteY3"/>
+                </a:cxn>
+                <a:cxn ang="0">
+                  <a:pos x="connsiteX4" y="connsiteY4"/>
+                </a:cxn>
+              </a:cxnLst>
+              <a:rect l="l" t="t" r="r" b="b"/>
+              <a:pathLst>
+                <a:path w="1168400" h="2360918">
+                  <a:moveTo>
+                    <a:pt x="1168400" y="0"/>
+                  </a:moveTo>
+                  <a:lnTo>
+                    <a:pt x="1168400" y="2360918"/>
+                  </a:lnTo>
+                  <a:lnTo>
+                    <a:pt x="1060340" y="2355461"/>
+                  </a:lnTo>
+                  <a:cubicBezTo>
+                    <a:pt x="464762" y="2294977"/>
+                    <a:pt x="0" y="1791994"/>
+                    <a:pt x="0" y="1180459"/>
+                  </a:cubicBezTo>
+                  <a:cubicBezTo>
+                    <a:pt x="0" y="568924"/>
+                    <a:pt x="464762" y="65941"/>
+                    <a:pt x="1060340" y="5457"/>
+                  </a:cubicBezTo>
+                  <a:close/>
+                </a:path>
+              </a:pathLst>
+            </a:custGeom>
+            <a:solidFill>
+              <a:srgbClr val="00A0A8"/>
+            </a:solidFill>
+            <a:ln>
+              <a:noFill/>
+            </a:ln>
+          </p:spPr>
+          <p:style>
+            <a:lnRef idx="2">
+              <a:schemeClr val="accent1">
+                <a:shade val="50000"/>
+              </a:schemeClr>
+            </a:lnRef>
+            <a:fillRef idx="1">
+              <a:schemeClr val="accent1"/>
+            </a:fillRef>
+            <a:effectRef idx="0">
+              <a:schemeClr val="accent1"/>
+            </a:effectRef>
+            <a:fontRef idx="minor">
+              <a:schemeClr val="lt1"/>
+            </a:fontRef>
+          </p:style>
+          <p:txBody>
+            <a:bodyPr rtlCol="0" anchor="ctr"/>
+            <a:lstStyle/>
+            <a:p>
+              <a:pPr algn="ctr"/>
+              <a:endParaRPr lang="en-US" dirty="0"/>
+            </a:p>
+          </p:txBody>
+        </p:sp>
+        <p:sp>
+          <p:nvSpPr>
+            <p:cNvPr id="79" name="TextBox 78">
+              <a:extLst>
+                <a:ext uri="{FF2B5EF4-FFF2-40B4-BE49-F238E27FC236}">
+                  <a16:creationId xmlns:a16="http://schemas.microsoft.com/office/drawing/2014/main" id="{701F5CFD-7EE1-475C-A36F-330184D5C6EC}"/>
+                </a:ext>
+              </a:extLst>
+            </p:cNvPr>
+            <p:cNvSpPr txBox="1"/>
+            <p:nvPr/>
+          </p:nvSpPr>
+          <p:spPr>
+            <a:xfrm rot="16200000">
+              <a:off x="-738260" y="3189608"/>
+              <a:ext cx="1992086" cy="646331"/>
+            </a:xfrm>
+            <a:prstGeom prst="rect">
+              <a:avLst/>
+            </a:prstGeom>
+            <a:noFill/>
+          </p:spPr>
+          <p:txBody>
+            <a:bodyPr wrap="square" rtlCol="0">
+              <a:spAutoFit/>
+            </a:bodyPr>
+            <a:lstStyle/>
+            <a:p>
+              <a:pPr algn="ctr"/>
+              <a:r>
+                <a:rPr lang="en-US" sz="3600" b="1" dirty="0">
+                  <a:solidFill>
+                    <a:srgbClr val="F0EEF0"/>
+                  </a:solidFill>
+                  <a:latin typeface="Tw Cen MT" panose="020B0602020104020603" pitchFamily="34" charset="0"/>
+                </a:rPr>
+                <a:t>contact</a:t>
+              </a:r>
+            </a:p>
+          </p:txBody>
+        </p:sp>
+        <p:pic>
+          <p:nvPicPr>
+            <p:cNvPr id="80" name="Picture 79">
+              <a:extLst>
+                <a:ext uri="{FF2B5EF4-FFF2-40B4-BE49-F238E27FC236}">
+                  <a16:creationId xmlns:a16="http://schemas.microsoft.com/office/drawing/2014/main" id="{B9F42291-FBD0-4239-8D69-22035DCB4AE6}"/>
+                </a:ext>
+              </a:extLst>
+            </p:cNvPr>
+            <p:cNvPicPr>
+              <a:picLocks noChangeAspect="1"/>
+            </p:cNvPicPr>
+            <p:nvPr/>
+          </p:nvPicPr>
+          <p:blipFill>
+            <a:blip r:embed="rId3">
+              <a:extLst>
+                <a:ext uri="{28A0092B-C50C-407E-A947-70E740481C1C}">
+                  <a14:useLocalDpi xmlns:a14="http://schemas.microsoft.com/office/drawing/2010/main" val="0"/>
+                </a:ext>
+              </a:extLst>
+            </a:blip>
+            <a:stretch>
+              <a:fillRect/>
+            </a:stretch>
+          </p:blipFill>
+          <p:spPr>
+            <a:xfrm rot="16200000">
+              <a:off x="-491912" y="3247473"/>
+              <a:ext cx="530600" cy="530600"/>
+            </a:xfrm>
+            <a:prstGeom prst="rect">
+              <a:avLst/>
+            </a:prstGeom>
+          </p:spPr>
+        </p:pic>
+      </p:grpSp>
+      <p:sp>
+        <p:nvSpPr>
+          <p:cNvPr id="2" name="TextBox 1">
+            <a:extLst>
+              <a:ext uri="{FF2B5EF4-FFF2-40B4-BE49-F238E27FC236}">
+                <a16:creationId xmlns:a16="http://schemas.microsoft.com/office/drawing/2014/main" id="{9747E67C-DDBE-459D-815A-EB1C9CD1C641}"/>
+              </a:ext>
+            </a:extLst>
+          </p:cNvPr>
+          <p:cNvSpPr txBox="1"/>
+          <p:nvPr/>
+        </p:nvSpPr>
+        <p:spPr>
+          <a:xfrm>
+            <a:off x="3267985" y="604299"/>
+            <a:ext cx="5100173" cy="584775"/>
+          </a:xfrm>
+          <a:prstGeom prst="rect">
+            <a:avLst/>
+          </a:prstGeom>
+          <a:noFill/>
+        </p:spPr>
+        <p:txBody>
+          <a:bodyPr wrap="square" rtlCol="0">
+            <a:spAutoFit/>
+          </a:bodyPr>
+          <a:lstStyle/>
+          <a:p>
+            <a:r>
+              <a:rPr lang="es-MX" sz="3200" b="1" dirty="0">
+                <a:solidFill>
+                  <a:srgbClr val="FF5969"/>
+                </a:solidFill>
+                <a:latin typeface="Tw Cen MT" panose="020B0602020104020603" pitchFamily="34" charset="0"/>
+              </a:rPr>
+              <a:t>Modelo Flexible y Digital</a:t>
+            </a:r>
+            <a:endParaRPr lang="en-US" sz="2400" b="1" dirty="0">
+              <a:solidFill>
+                <a:srgbClr val="FF5969"/>
+              </a:solidFill>
+              <a:latin typeface="Tw Cen MT" panose="020B0602020104020603" pitchFamily="34" charset="0"/>
+            </a:endParaRPr>
+          </a:p>
+        </p:txBody>
+      </p:sp>
+      <p:grpSp>
+        <p:nvGrpSpPr>
+          <p:cNvPr id="13" name="Group 12">
+            <a:extLst>
+              <a:ext uri="{FF2B5EF4-FFF2-40B4-BE49-F238E27FC236}">
+                <a16:creationId xmlns:a16="http://schemas.microsoft.com/office/drawing/2014/main" id="{3093B9D7-A7CB-45B2-B1C8-59CB1D74BC3C}"/>
+              </a:ext>
+            </a:extLst>
+          </p:cNvPr>
+          <p:cNvGrpSpPr/>
+          <p:nvPr/>
+        </p:nvGrpSpPr>
+        <p:grpSpPr>
+          <a:xfrm>
+            <a:off x="3307839" y="1575008"/>
+            <a:ext cx="8378792" cy="887767"/>
+            <a:chOff x="3307839" y="2514671"/>
+            <a:chExt cx="8378792" cy="887767"/>
+          </a:xfrm>
+        </p:grpSpPr>
+        <p:pic>
+          <p:nvPicPr>
+            <p:cNvPr id="7" name="Picture 6">
+              <a:extLst>
+                <a:ext uri="{FF2B5EF4-FFF2-40B4-BE49-F238E27FC236}">
+                  <a16:creationId xmlns:a16="http://schemas.microsoft.com/office/drawing/2014/main" id="{153BD0ED-B64F-4A9B-8622-8D88F7B0D84C}"/>
+                </a:ext>
+              </a:extLst>
+            </p:cNvPr>
+            <p:cNvPicPr>
+              <a:picLocks noChangeAspect="1"/>
+            </p:cNvPicPr>
+            <p:nvPr/>
+          </p:nvPicPr>
+          <p:blipFill>
+            <a:blip r:embed="rId4">
+              <a:extLst>
+                <a:ext uri="{BEBA8EAE-BF5A-486C-A8C5-ECC9F3942E4B}">
+                  <a14:imgProps xmlns:a14="http://schemas.microsoft.com/office/drawing/2010/main">
+                    <a14:imgLayer r:embed="rId5">
+                      <a14:imgEffect>
+                        <a14:backgroundRemoval t="10000" b="98750" l="2500" r="90000">
+                          <a14:foregroundMark x1="13750" y1="86250" x2="2500" y2="98750"/>
+                          <a14:foregroundMark x1="87500" y1="10000" x2="86250" y2="10000"/>
+                        </a14:backgroundRemoval>
+                      </a14:imgEffect>
+                    </a14:imgLayer>
+                  </a14:imgProps>
+                </a:ext>
+              </a:extLst>
+            </a:blip>
+            <a:stretch>
+              <a:fillRect/>
+            </a:stretch>
+          </p:blipFill>
+          <p:spPr>
+            <a:xfrm>
+              <a:off x="3307839" y="2516729"/>
+              <a:ext cx="885709" cy="885709"/>
+            </a:xfrm>
+            <a:prstGeom prst="rect">
+              <a:avLst/>
+            </a:prstGeom>
+          </p:spPr>
+        </p:pic>
+        <p:sp>
+          <p:nvSpPr>
+            <p:cNvPr id="49" name="TextBox 48">
+              <a:extLst>
+                <a:ext uri="{FF2B5EF4-FFF2-40B4-BE49-F238E27FC236}">
+                  <a16:creationId xmlns:a16="http://schemas.microsoft.com/office/drawing/2014/main" id="{BF5E105D-25F5-42C2-8F34-CD2DEB32ECE1}"/>
+                </a:ext>
+              </a:extLst>
+            </p:cNvPr>
+            <p:cNvSpPr txBox="1"/>
+            <p:nvPr/>
+          </p:nvSpPr>
+          <p:spPr>
+            <a:xfrm>
+              <a:off x="4213409" y="2514671"/>
+              <a:ext cx="7473222" cy="830997"/>
+            </a:xfrm>
+            <a:prstGeom prst="rect">
+              <a:avLst/>
+            </a:prstGeom>
+            <a:noFill/>
+          </p:spPr>
+          <p:txBody>
+            <a:bodyPr wrap="square" rtlCol="0">
+              <a:spAutoFit/>
+            </a:bodyPr>
+            <a:lstStyle/>
+            <a:p>
+              <a:r>
+                <a:rPr lang="es-MX" sz="2400" b="1" dirty="0">
+                  <a:solidFill>
+                    <a:srgbClr val="5D7373"/>
+                  </a:solidFill>
+                  <a:latin typeface="Tw Cen MT" panose="020B0602020104020603" pitchFamily="34" charset="0"/>
+                </a:rPr>
+                <a:t>Sesiones síncronas</a:t>
+              </a:r>
+            </a:p>
+            <a:p>
+              <a:pPr marL="342900" indent="-342900">
+                <a:buFontTx/>
+                <a:buChar char="-"/>
+              </a:pPr>
+              <a:r>
+                <a:rPr lang="es-MX" sz="2400" dirty="0">
+                  <a:solidFill>
+                    <a:srgbClr val="5D7373"/>
+                  </a:solidFill>
+                  <a:latin typeface="Tw Cen MT" panose="020B0602020104020603" pitchFamily="34" charset="0"/>
+                </a:rPr>
+                <a:t>Clase remota</a:t>
+              </a:r>
+            </a:p>
+          </p:txBody>
+        </p:sp>
+      </p:grpSp>
+      <p:grpSp>
+        <p:nvGrpSpPr>
+          <p:cNvPr id="15" name="Group 14">
+            <a:extLst>
+              <a:ext uri="{FF2B5EF4-FFF2-40B4-BE49-F238E27FC236}">
+                <a16:creationId xmlns:a16="http://schemas.microsoft.com/office/drawing/2014/main" id="{4113622F-E706-405B-9741-D2DDA8EA5D3F}"/>
+              </a:ext>
+            </a:extLst>
+          </p:cNvPr>
+          <p:cNvGrpSpPr/>
+          <p:nvPr/>
+        </p:nvGrpSpPr>
+        <p:grpSpPr>
+          <a:xfrm>
+            <a:off x="3307839" y="3428999"/>
+            <a:ext cx="8378792" cy="1938992"/>
+            <a:chOff x="3307839" y="4382001"/>
+            <a:chExt cx="8378792" cy="1938992"/>
+          </a:xfrm>
+        </p:grpSpPr>
+        <p:pic>
+          <p:nvPicPr>
+            <p:cNvPr id="5" name="Picture 4">
+              <a:extLst>
+                <a:ext uri="{FF2B5EF4-FFF2-40B4-BE49-F238E27FC236}">
+                  <a16:creationId xmlns:a16="http://schemas.microsoft.com/office/drawing/2014/main" id="{BDD6BB46-6526-4ABC-9397-6D230D07B9A8}"/>
+                </a:ext>
+              </a:extLst>
+            </p:cNvPr>
+            <p:cNvPicPr>
+              <a:picLocks noChangeAspect="1"/>
+            </p:cNvPicPr>
+            <p:nvPr/>
+          </p:nvPicPr>
+          <p:blipFill>
+            <a:blip r:embed="rId6">
+              <a:extLst>
+                <a:ext uri="{BEBA8EAE-BF5A-486C-A8C5-ECC9F3942E4B}">
+                  <a14:imgProps xmlns:a14="http://schemas.microsoft.com/office/drawing/2010/main">
+                    <a14:imgLayer r:embed="rId7">
+                      <a14:imgEffect>
+                        <a14:backgroundRemoval t="7500" b="98750" l="1250" r="91250">
+                          <a14:foregroundMark x1="17500" y1="73750" x2="15466" y2="94091"/>
+                          <a14:foregroundMark x1="1250" y1="96250" x2="7500" y2="62500"/>
+                          <a14:foregroundMark x1="85000" y1="17500" x2="91250" y2="7500"/>
+                          <a14:foregroundMark x1="48750" y1="32500" x2="38750" y2="42500"/>
+                          <a14:backgroundMark x1="12500" y1="98750" x2="17500" y2="98750"/>
+                          <a14:backgroundMark x1="1250" y1="97500" x2="1250" y2="98750"/>
+                        </a14:backgroundRemoval>
+                      </a14:imgEffect>
+                    </a14:imgLayer>
+                  </a14:imgProps>
+                </a:ext>
+              </a:extLst>
+            </a:blip>
+            <a:stretch>
+              <a:fillRect/>
+            </a:stretch>
+          </p:blipFill>
+          <p:spPr>
+            <a:xfrm>
+              <a:off x="3307839" y="4905373"/>
+              <a:ext cx="885709" cy="885709"/>
+            </a:xfrm>
+            <a:prstGeom prst="rect">
+              <a:avLst/>
+            </a:prstGeom>
+          </p:spPr>
+        </p:pic>
+        <p:sp>
+          <p:nvSpPr>
+            <p:cNvPr id="81" name="TextBox 80">
+              <a:extLst>
+                <a:ext uri="{FF2B5EF4-FFF2-40B4-BE49-F238E27FC236}">
+                  <a16:creationId xmlns:a16="http://schemas.microsoft.com/office/drawing/2014/main" id="{412A8485-E8C1-45F3-AE6A-3D96C6AAE968}"/>
+                </a:ext>
+              </a:extLst>
+            </p:cNvPr>
+            <p:cNvSpPr txBox="1"/>
+            <p:nvPr/>
+          </p:nvSpPr>
+          <p:spPr>
+            <a:xfrm>
+              <a:off x="4213409" y="4382001"/>
+              <a:ext cx="7473222" cy="1938992"/>
+            </a:xfrm>
+            <a:prstGeom prst="rect">
+              <a:avLst/>
+            </a:prstGeom>
+            <a:noFill/>
+          </p:spPr>
+          <p:txBody>
+            <a:bodyPr wrap="square" rtlCol="0">
+              <a:spAutoFit/>
+            </a:bodyPr>
+            <a:lstStyle/>
+            <a:p>
+              <a:r>
+                <a:rPr lang="es-MX" sz="2400" b="1" dirty="0">
+                  <a:solidFill>
+                    <a:srgbClr val="5D7373"/>
+                  </a:solidFill>
+                  <a:latin typeface="Tw Cen MT" panose="020B0602020104020603" pitchFamily="34" charset="0"/>
+                </a:rPr>
+                <a:t>Sesiones asíncronas</a:t>
+              </a:r>
+            </a:p>
+            <a:p>
+              <a:pPr marL="342900" indent="-342900">
+                <a:buFontTx/>
+                <a:buChar char="-"/>
+              </a:pPr>
+              <a:r>
+                <a:rPr lang="es-MX" sz="2400" dirty="0">
+                  <a:solidFill>
+                    <a:srgbClr val="5D7373"/>
+                  </a:solidFill>
+                  <a:latin typeface="Tw Cen MT" panose="020B0602020104020603" pitchFamily="34" charset="0"/>
+                </a:rPr>
+                <a:t>Actividades basadas en objetivos</a:t>
+              </a:r>
+            </a:p>
+            <a:p>
+              <a:pPr marL="342900" indent="-342900">
+                <a:buFontTx/>
+                <a:buChar char="-"/>
+              </a:pPr>
+              <a:r>
+                <a:rPr lang="es-MX" sz="2400" dirty="0">
+                  <a:solidFill>
+                    <a:srgbClr val="5D7373"/>
+                  </a:solidFill>
+                  <a:latin typeface="Tw Cen MT" panose="020B0602020104020603" pitchFamily="34" charset="0"/>
+                </a:rPr>
+                <a:t>Entregas por </a:t>
+              </a:r>
+              <a:r>
+                <a:rPr lang="es-MX" sz="2400" dirty="0" err="1">
+                  <a:solidFill>
+                    <a:srgbClr val="5D7373"/>
+                  </a:solidFill>
+                  <a:latin typeface="Tw Cen MT" panose="020B0602020104020603" pitchFamily="34" charset="0"/>
+                </a:rPr>
+                <a:t>Canvas</a:t>
+              </a:r>
+              <a:endParaRPr lang="es-MX" sz="2400" dirty="0">
+                <a:solidFill>
+                  <a:srgbClr val="5D7373"/>
+                </a:solidFill>
+                <a:latin typeface="Tw Cen MT" panose="020B0602020104020603" pitchFamily="34" charset="0"/>
+              </a:endParaRPr>
+            </a:p>
+            <a:p>
+              <a:pPr marL="342900" indent="-342900">
+                <a:buFontTx/>
+                <a:buChar char="-"/>
+              </a:pPr>
+              <a:r>
+                <a:rPr lang="es-MX" sz="2400" dirty="0">
+                  <a:solidFill>
+                    <a:srgbClr val="5D7373"/>
+                  </a:solidFill>
+                  <a:latin typeface="Tw Cen MT" panose="020B0602020104020603" pitchFamily="34" charset="0"/>
+                </a:rPr>
+                <a:t>Individuales / Equipo</a:t>
+              </a:r>
+            </a:p>
+            <a:p>
+              <a:pPr marL="342900" indent="-342900">
+                <a:buFontTx/>
+                <a:buChar char="-"/>
+              </a:pPr>
+              <a:r>
+                <a:rPr lang="en-US" sz="2400" dirty="0">
+                  <a:solidFill>
+                    <a:srgbClr val="5D7373"/>
+                  </a:solidFill>
+                  <a:latin typeface="Tw Cen MT" panose="020B0602020104020603" pitchFamily="34" charset="0"/>
+                </a:rPr>
+                <a:t>Se </a:t>
+              </a:r>
+              <a:r>
+                <a:rPr lang="en-US" sz="2400" dirty="0" err="1">
+                  <a:solidFill>
+                    <a:srgbClr val="5D7373"/>
+                  </a:solidFill>
+                  <a:latin typeface="Tw Cen MT" panose="020B0602020104020603" pitchFamily="34" charset="0"/>
+                </a:rPr>
+                <a:t>toma</a:t>
+              </a:r>
+              <a:r>
+                <a:rPr lang="en-US" sz="2400" dirty="0">
+                  <a:solidFill>
+                    <a:srgbClr val="5D7373"/>
+                  </a:solidFill>
+                  <a:latin typeface="Tw Cen MT" panose="020B0602020104020603" pitchFamily="34" charset="0"/>
+                </a:rPr>
+                <a:t> </a:t>
+              </a:r>
+              <a:r>
+                <a:rPr lang="en-US" sz="2400" dirty="0" err="1">
+                  <a:solidFill>
+                    <a:srgbClr val="5D7373"/>
+                  </a:solidFill>
+                  <a:latin typeface="Tw Cen MT" panose="020B0602020104020603" pitchFamily="34" charset="0"/>
+                </a:rPr>
+                <a:t>lista</a:t>
+              </a:r>
+              <a:r>
+                <a:rPr lang="en-US" sz="2400" dirty="0">
+                  <a:solidFill>
+                    <a:srgbClr val="5D7373"/>
+                  </a:solidFill>
+                  <a:latin typeface="Tw Cen MT" panose="020B0602020104020603" pitchFamily="34" charset="0"/>
+                </a:rPr>
+                <a:t> al principio de la </a:t>
+              </a:r>
+              <a:r>
+                <a:rPr lang="en-US" sz="2400" dirty="0" err="1">
+                  <a:solidFill>
+                    <a:srgbClr val="5D7373"/>
+                  </a:solidFill>
+                  <a:latin typeface="Tw Cen MT" panose="020B0602020104020603" pitchFamily="34" charset="0"/>
+                </a:rPr>
+                <a:t>clase</a:t>
+              </a:r>
+              <a:endParaRPr lang="en-US" sz="2400" dirty="0">
+                <a:solidFill>
+                  <a:srgbClr val="5D7373"/>
+                </a:solidFill>
+                <a:latin typeface="Tw Cen MT" panose="020B0602020104020603" pitchFamily="34" charset="0"/>
+              </a:endParaRPr>
+            </a:p>
+          </p:txBody>
+        </p:sp>
+      </p:grpSp>
+      <p:pic>
+        <p:nvPicPr>
+          <p:cNvPr id="11" name="Picture 10" descr="A picture containing building&#10;&#10;Description automatically generated">
+            <a:extLst>
+              <a:ext uri="{FF2B5EF4-FFF2-40B4-BE49-F238E27FC236}">
+                <a16:creationId xmlns:a16="http://schemas.microsoft.com/office/drawing/2014/main" id="{95F738C2-FBCD-407E-A0EF-ECFE36EE91D5}"/>
+              </a:ext>
+            </a:extLst>
+          </p:cNvPr>
+          <p:cNvPicPr>
+            <a:picLocks noChangeAspect="1"/>
+          </p:cNvPicPr>
+          <p:nvPr/>
+        </p:nvPicPr>
+        <p:blipFill>
+          <a:blip r:embed="rId8">
+            <a:extLst>
+              <a:ext uri="{28A0092B-C50C-407E-A947-70E740481C1C}">
+                <a14:useLocalDpi xmlns:a14="http://schemas.microsoft.com/office/drawing/2010/main" val="0"/>
+              </a:ext>
+            </a:extLst>
+          </a:blip>
+          <a:stretch>
+            <a:fillRect/>
+          </a:stretch>
+        </p:blipFill>
+        <p:spPr>
+          <a:xfrm>
+            <a:off x="8318530" y="744269"/>
+            <a:ext cx="2684730" cy="2684730"/>
+          </a:xfrm>
+          <a:prstGeom prst="rect">
+            <a:avLst/>
+          </a:prstGeom>
+        </p:spPr>
+      </p:pic>
+    </p:spTree>
+    <p:extLst>
+      <p:ext uri="{BB962C8B-B14F-4D97-AF65-F5344CB8AC3E}">
+        <p14:creationId xmlns:p14="http://schemas.microsoft.com/office/powerpoint/2010/main" val="938289305"/>
+      </p:ext>
+    </p:extLst>
+  </p:cSld>
+  <p:clrMapOvr>
+    <a:masterClrMapping/>
+  </p:clrMapOvr>
+  <mc:AlternateContent xmlns:mc="http://schemas.openxmlformats.org/markup-compatibility/2006" xmlns:p159="http://schemas.microsoft.com/office/powerpoint/2015/09/main">
+    <mc:Choice Requires="p159">
+      <p:transition spd="med">
+        <p159:morph option="byObject"/>
+      </p:transition>
+    </mc:Choice>
+    <mc:Fallback xmlns="">
+      <p:transition spd="med">
+        <p:fade/>
+      </p:transition>
+    </mc:Fallback>
+  </mc:AlternateContent>
+</p:sld>
+</file>
+
+<file path=ppt/slides/slide4.xml><?xml version="1.0" encoding="utf-8"?>
 <p:sld xmlns:a="http://schemas.openxmlformats.org/drawingml/2006/main" xmlns:r="http://schemas.openxmlformats.org/officeDocument/2006/relationships" xmlns:p="http://schemas.openxmlformats.org/presentationml/2006/main">
   <p:cSld>
     <p:spTree>
@@ -12811,7 +15151,7 @@
 </p:sld>
 </file>
 
-<file path=ppt/slides/slide4.xml><?xml version="1.0" encoding="utf-8"?>
+<file path=ppt/slides/slide5.xml><?xml version="1.0" encoding="utf-8"?>
 <p:sld xmlns:a="http://schemas.openxmlformats.org/drawingml/2006/main" xmlns:r="http://schemas.openxmlformats.org/officeDocument/2006/relationships" xmlns:p="http://schemas.openxmlformats.org/presentationml/2006/main">
   <p:cSld>
     <p:spTree>
@@ -15658,7 +17998,7 @@
 </p:sld>
 </file>
 
-<file path=ppt/slides/slide5.xml><?xml version="1.0" encoding="utf-8"?>
+<file path=ppt/slides/slide6.xml><?xml version="1.0" encoding="utf-8"?>
 <p:sld xmlns:a="http://schemas.openxmlformats.org/drawingml/2006/main" xmlns:r="http://schemas.openxmlformats.org/officeDocument/2006/relationships" xmlns:p="http://schemas.openxmlformats.org/presentationml/2006/main">
   <p:cSld>
     <p:spTree>
@@ -18638,7 +20978,7 @@
 </p:sld>
 </file>
 
-<file path=ppt/slides/slide6.xml><?xml version="1.0" encoding="utf-8"?>
+<file path=ppt/slides/slide7.xml><?xml version="1.0" encoding="utf-8"?>
 <p:sld xmlns:a="http://schemas.openxmlformats.org/drawingml/2006/main" xmlns:r="http://schemas.openxmlformats.org/officeDocument/2006/relationships" xmlns:p="http://schemas.openxmlformats.org/presentationml/2006/main">
   <p:cSld>
     <p:spTree>
@@ -22096,7 +24436,7 @@
 </p:sld>
 </file>
 
-<file path=ppt/slides/slide7.xml><?xml version="1.0" encoding="utf-8"?>
+<file path=ppt/slides/slide8.xml><?xml version="1.0" encoding="utf-8"?>
 <p:sld xmlns:a="http://schemas.openxmlformats.org/drawingml/2006/main" xmlns:r="http://schemas.openxmlformats.org/officeDocument/2006/relationships" xmlns:p="http://schemas.openxmlformats.org/presentationml/2006/main">
   <p:cSld>
     <p:spTree>
@@ -22363,7 +24703,7 @@
             <p:nvPr/>
           </p:nvPicPr>
           <p:blipFill>
-            <a:blip r:embed="rId2">
+            <a:blip r:embed="rId3">
               <a:extLst>
                 <a:ext uri="{28A0092B-C50C-407E-A947-70E740481C1C}">
                   <a14:useLocalDpi xmlns:a14="http://schemas.microsoft.com/office/drawing/2010/main" val="0"/>
@@ -22629,7 +24969,7 @@
             <p:nvPr/>
           </p:nvPicPr>
           <p:blipFill>
-            <a:blip r:embed="rId2">
+            <a:blip r:embed="rId3">
               <a:extLst>
                 <a:ext uri="{28A0092B-C50C-407E-A947-70E740481C1C}">
                   <a14:useLocalDpi xmlns:a14="http://schemas.microsoft.com/office/drawing/2010/main" val="0"/>
@@ -22895,7 +25235,7 @@
             <p:nvPr/>
           </p:nvPicPr>
           <p:blipFill>
-            <a:blip r:embed="rId2">
+            <a:blip r:embed="rId3">
               <a:extLst>
                 <a:ext uri="{28A0092B-C50C-407E-A947-70E740481C1C}">
                   <a14:useLocalDpi xmlns:a14="http://schemas.microsoft.com/office/drawing/2010/main" val="0"/>
@@ -23167,7 +25507,7 @@
             <p:nvPr/>
           </p:nvPicPr>
           <p:blipFill>
-            <a:blip r:embed="rId2">
+            <a:blip r:embed="rId3">
               <a:extLst>
                 <a:ext uri="{28A0092B-C50C-407E-A947-70E740481C1C}">
                   <a14:useLocalDpi xmlns:a14="http://schemas.microsoft.com/office/drawing/2010/main" val="0"/>
@@ -23439,7 +25779,7 @@
             <p:nvPr/>
           </p:nvPicPr>
           <p:blipFill>
-            <a:blip r:embed="rId2">
+            <a:blip r:embed="rId3">
               <a:extLst>
                 <a:ext uri="{28A0092B-C50C-407E-A947-70E740481C1C}">
                   <a14:useLocalDpi xmlns:a14="http://schemas.microsoft.com/office/drawing/2010/main" val="0"/>
@@ -23705,7 +26045,7 @@
             <p:nvPr/>
           </p:nvPicPr>
           <p:blipFill>
-            <a:blip r:embed="rId2">
+            <a:blip r:embed="rId3">
               <a:extLst>
                 <a:ext uri="{28A0092B-C50C-407E-A947-70E740481C1C}">
                   <a14:useLocalDpi xmlns:a14="http://schemas.microsoft.com/office/drawing/2010/main" val="0"/>
@@ -23741,7 +26081,7 @@
         </p:nvGrpSpPr>
         <p:grpSpPr>
           <a:xfrm>
-            <a:off x="2911521" y="2358338"/>
+            <a:off x="2732882" y="3256840"/>
             <a:ext cx="2336800" cy="2512268"/>
             <a:chOff x="313715" y="1912773"/>
             <a:chExt cx="2336800" cy="2512268"/>
@@ -23855,13 +26195,13 @@
             <p:nvPr/>
           </p:nvPicPr>
           <p:blipFill>
-            <a:blip r:embed="rId3">
+            <a:blip r:embed="rId4">
               <a:extLst>
                 <a:ext uri="{28A0092B-C50C-407E-A947-70E740481C1C}">
                   <a14:useLocalDpi xmlns:a14="http://schemas.microsoft.com/office/drawing/2010/main" val="0"/>
                 </a:ext>
                 <a:ext uri="{96DAC541-7B7A-43D3-8B79-37D633B846F1}">
-                  <asvg:svgBlip xmlns:asvg="http://schemas.microsoft.com/office/drawing/2016/SVG/main" r:embed="rId4"/>
+                  <asvg:svgBlip xmlns:asvg="http://schemas.microsoft.com/office/drawing/2016/SVG/main" r:embed="rId5"/>
                 </a:ext>
               </a:extLst>
             </a:blip>
@@ -23894,7 +26234,7 @@
         </p:nvGrpSpPr>
         <p:grpSpPr>
           <a:xfrm>
-            <a:off x="5408416" y="2338403"/>
+            <a:off x="5408416" y="3236905"/>
             <a:ext cx="2964180" cy="2553103"/>
             <a:chOff x="2941320" y="1875469"/>
             <a:chExt cx="2964180" cy="2553103"/>
@@ -24023,13 +26363,13 @@
             <p:nvPr/>
           </p:nvPicPr>
           <p:blipFill>
-            <a:blip r:embed="rId5">
+            <a:blip r:embed="rId6">
               <a:extLst>
                 <a:ext uri="{28A0092B-C50C-407E-A947-70E740481C1C}">
                   <a14:useLocalDpi xmlns:a14="http://schemas.microsoft.com/office/drawing/2010/main" val="0"/>
                 </a:ext>
                 <a:ext uri="{96DAC541-7B7A-43D3-8B79-37D633B846F1}">
-                  <asvg:svgBlip xmlns:asvg="http://schemas.microsoft.com/office/drawing/2016/SVG/main" r:embed="rId6"/>
+                  <asvg:svgBlip xmlns:asvg="http://schemas.microsoft.com/office/drawing/2016/SVG/main" r:embed="rId7"/>
                 </a:ext>
               </a:extLst>
             </a:blip>
@@ -24062,7 +26402,7 @@
         </p:nvGrpSpPr>
         <p:grpSpPr>
           <a:xfrm>
-            <a:off x="274204" y="2337439"/>
+            <a:off x="274204" y="3235941"/>
             <a:ext cx="2336800" cy="2928064"/>
             <a:chOff x="5820657" y="1870166"/>
             <a:chExt cx="2336800" cy="2928064"/>
@@ -24200,13 +26540,13 @@
             <p:nvPr/>
           </p:nvPicPr>
           <p:blipFill>
-            <a:blip r:embed="rId7">
+            <a:blip r:embed="rId8">
               <a:extLst>
                 <a:ext uri="{28A0092B-C50C-407E-A947-70E740481C1C}">
                   <a14:useLocalDpi xmlns:a14="http://schemas.microsoft.com/office/drawing/2010/main" val="0"/>
                 </a:ext>
                 <a:ext uri="{96DAC541-7B7A-43D3-8B79-37D633B846F1}">
-                  <asvg:svgBlip xmlns:asvg="http://schemas.microsoft.com/office/drawing/2016/SVG/main" r:embed="rId8"/>
+                  <asvg:svgBlip xmlns:asvg="http://schemas.microsoft.com/office/drawing/2016/SVG/main" r:embed="rId9"/>
                 </a:ext>
               </a:extLst>
             </a:blip>
@@ -24224,6 +26564,405 @@
             </a:prstGeom>
           </p:spPr>
         </p:pic>
+      </p:grpSp>
+      <p:grpSp>
+        <p:nvGrpSpPr>
+          <p:cNvPr id="10" name="Group 9">
+            <a:extLst>
+              <a:ext uri="{FF2B5EF4-FFF2-40B4-BE49-F238E27FC236}">
+                <a16:creationId xmlns:a16="http://schemas.microsoft.com/office/drawing/2014/main" id="{A4244CF2-6962-43F4-B80E-37CC8FEC5184}"/>
+              </a:ext>
+            </a:extLst>
+          </p:cNvPr>
+          <p:cNvGrpSpPr/>
+          <p:nvPr/>
+        </p:nvGrpSpPr>
+        <p:grpSpPr>
+          <a:xfrm>
+            <a:off x="416842" y="763330"/>
+            <a:ext cx="2051524" cy="1669624"/>
+            <a:chOff x="1697722" y="685230"/>
+            <a:chExt cx="2051524" cy="1669624"/>
+          </a:xfrm>
+        </p:grpSpPr>
+        <p:pic>
+          <p:nvPicPr>
+            <p:cNvPr id="5" name="Picture 4" descr="A picture containing game&#10;&#10;Description automatically generated">
+              <a:extLst>
+                <a:ext uri="{FF2B5EF4-FFF2-40B4-BE49-F238E27FC236}">
+                  <a16:creationId xmlns:a16="http://schemas.microsoft.com/office/drawing/2014/main" id="{56F6F21C-80F9-484F-81C9-8E9C75120DBF}"/>
+                </a:ext>
+              </a:extLst>
+            </p:cNvPr>
+            <p:cNvPicPr>
+              <a:picLocks noChangeAspect="1"/>
+            </p:cNvPicPr>
+            <p:nvPr/>
+          </p:nvPicPr>
+          <p:blipFill>
+            <a:blip r:embed="rId10">
+              <a:extLst>
+                <a:ext uri="{BEBA8EAE-BF5A-486C-A8C5-ECC9F3942E4B}">
+                  <a14:imgProps xmlns:a14="http://schemas.microsoft.com/office/drawing/2010/main">
+                    <a14:imgLayer r:embed="rId11">
+                      <a14:imgEffect>
+                        <a14:backgroundRemoval t="5901" b="96429" l="4643" r="95714">
+                          <a14:foregroundMark x1="9643" y1="51863" x2="5952" y2="59783"/>
+                          <a14:foregroundMark x1="5952" y1="59783" x2="6905" y2="67857"/>
+                          <a14:foregroundMark x1="6905" y1="67857" x2="13690" y2="82919"/>
+                          <a14:foregroundMark x1="13690" y1="82919" x2="18571" y2="88043"/>
+                          <a14:foregroundMark x1="18571" y1="88043" x2="19405" y2="79503"/>
+                          <a14:foregroundMark x1="19405" y1="79503" x2="12262" y2="77795"/>
+                          <a14:foregroundMark x1="12262" y1="77795" x2="9167" y2="70031"/>
+                          <a14:foregroundMark x1="9167" y1="70031" x2="9762" y2="61801"/>
+                          <a14:foregroundMark x1="6190" y1="62733" x2="4643" y2="70963"/>
+                          <a14:foregroundMark x1="4643" y1="70963" x2="4762" y2="69876"/>
+                          <a14:foregroundMark x1="27381" y1="11491" x2="33571" y2="8385"/>
+                          <a14:foregroundMark x1="33571" y1="8385" x2="27619" y2="9938"/>
+                          <a14:foregroundMark x1="27619" y1="9938" x2="33095" y2="8385"/>
+                          <a14:foregroundMark x1="69881" y1="9627" x2="71071" y2="11801"/>
+                          <a14:foregroundMark x1="92381" y1="68012" x2="93929" y2="75776"/>
+                          <a14:foregroundMark x1="93929" y1="75776" x2="93214" y2="56056"/>
+                          <a14:foregroundMark x1="93214" y1="56056" x2="92024" y2="75466"/>
+                          <a14:foregroundMark x1="92024" y1="75466" x2="87262" y2="81832"/>
+                          <a14:foregroundMark x1="87262" y1="81832" x2="79524" y2="86646"/>
+                          <a14:foregroundMark x1="79524" y1="86646" x2="85833" y2="83851"/>
+                          <a14:foregroundMark x1="85833" y1="83851" x2="78690" y2="86957"/>
+                          <a14:foregroundMark x1="78690" y1="86957" x2="75595" y2="90217"/>
+                          <a14:foregroundMark x1="20000" y1="89441" x2="26667" y2="92081"/>
+                          <a14:foregroundMark x1="26667" y1="92081" x2="19643" y2="90994"/>
+                          <a14:foregroundMark x1="19643" y1="90994" x2="23194" y2="92965"/>
+                          <a14:foregroundMark x1="25538" y1="94099" x2="25714" y2="94099"/>
+                          <a14:foregroundMark x1="80833" y1="91615" x2="74881" y2="93789"/>
+                          <a14:foregroundMark x1="74881" y1="93789" x2="74048" y2="94876"/>
+                          <a14:foregroundMark x1="94405" y1="75311" x2="94167" y2="57143"/>
+                          <a14:foregroundMark x1="94167" y1="57143" x2="95952" y2="72516"/>
+                          <a14:foregroundMark x1="68571" y1="10248" x2="63214" y2="5901"/>
+                          <a14:foregroundMark x1="63214" y1="5901" x2="67143" y2="6988"/>
+                          <a14:foregroundMark x1="26149" y1="95270" x2="26310" y2="95186"/>
+                          <a14:foregroundMark x1="24791" y1="95979" x2="25149" y2="95792"/>
+                          <a14:backgroundMark x1="24048" y1="96118" x2="23690" y2="96584"/>
+                          <a14:backgroundMark x1="24762" y1="96584" x2="24286" y2="96118"/>
+                          <a14:backgroundMark x1="25000" y1="96584" x2="24048" y2="95652"/>
+                          <a14:backgroundMark x1="25357" y1="96584" x2="25714" y2="95497"/>
+                          <a14:backgroundMark x1="26429" y1="95807" x2="25238" y2="95963"/>
+                        </a14:backgroundRemoval>
+                      </a14:imgEffect>
+                    </a14:imgLayer>
+                  </a14:imgProps>
+                </a:ext>
+                <a:ext uri="{28A0092B-C50C-407E-A947-70E740481C1C}">
+                  <a14:useLocalDpi xmlns:a14="http://schemas.microsoft.com/office/drawing/2010/main" val="0"/>
+                </a:ext>
+              </a:extLst>
+            </a:blip>
+            <a:stretch>
+              <a:fillRect/>
+            </a:stretch>
+          </p:blipFill>
+          <p:spPr>
+            <a:xfrm>
+              <a:off x="1956594" y="685230"/>
+              <a:ext cx="1533780" cy="1175898"/>
+            </a:xfrm>
+            <a:prstGeom prst="rect">
+              <a:avLst/>
+            </a:prstGeom>
+          </p:spPr>
+        </p:pic>
+        <p:sp>
+          <p:nvSpPr>
+            <p:cNvPr id="9" name="Rectangle 8">
+              <a:extLst>
+                <a:ext uri="{FF2B5EF4-FFF2-40B4-BE49-F238E27FC236}">
+                  <a16:creationId xmlns:a16="http://schemas.microsoft.com/office/drawing/2014/main" id="{B9B730C2-DB3D-4D64-9B0F-F4B4AD8A72F2}"/>
+                </a:ext>
+              </a:extLst>
+            </p:cNvPr>
+            <p:cNvSpPr/>
+            <p:nvPr/>
+          </p:nvSpPr>
+          <p:spPr>
+            <a:xfrm>
+              <a:off x="1697722" y="1985522"/>
+              <a:ext cx="2051524" cy="369332"/>
+            </a:xfrm>
+            <a:prstGeom prst="rect">
+              <a:avLst/>
+            </a:prstGeom>
+          </p:spPr>
+          <p:txBody>
+            <a:bodyPr wrap="none">
+              <a:spAutoFit/>
+            </a:bodyPr>
+            <a:lstStyle/>
+            <a:p>
+              <a:r>
+                <a:rPr lang="en-US" b="1" dirty="0">
+                  <a:solidFill>
+                    <a:srgbClr val="7188D8"/>
+                  </a:solidFill>
+                  <a:latin typeface="Tw Cen MT" panose="020B0602020104020603" pitchFamily="34" charset="0"/>
+                </a:rPr>
+                <a:t>discord.gg/pJMveA</a:t>
+              </a:r>
+            </a:p>
+          </p:txBody>
+        </p:sp>
+      </p:grpSp>
+      <p:grpSp>
+        <p:nvGrpSpPr>
+          <p:cNvPr id="15" name="Group 14">
+            <a:extLst>
+              <a:ext uri="{FF2B5EF4-FFF2-40B4-BE49-F238E27FC236}">
+                <a16:creationId xmlns:a16="http://schemas.microsoft.com/office/drawing/2014/main" id="{E8C8035E-3611-4B80-B093-8EF71033FDC9}"/>
+              </a:ext>
+            </a:extLst>
+          </p:cNvPr>
+          <p:cNvGrpSpPr/>
+          <p:nvPr/>
+        </p:nvGrpSpPr>
+        <p:grpSpPr>
+          <a:xfrm>
+            <a:off x="3045149" y="748978"/>
+            <a:ext cx="2313711" cy="1648352"/>
+            <a:chOff x="4015909" y="870635"/>
+            <a:chExt cx="2313711" cy="1648352"/>
+          </a:xfrm>
+        </p:grpSpPr>
+        <p:pic>
+          <p:nvPicPr>
+            <p:cNvPr id="8" name="Picture 7" descr="A close up of a logo&#10;&#10;Description automatically generated">
+              <a:extLst>
+                <a:ext uri="{FF2B5EF4-FFF2-40B4-BE49-F238E27FC236}">
+                  <a16:creationId xmlns:a16="http://schemas.microsoft.com/office/drawing/2014/main" id="{410DB51F-CB13-4333-BA1D-F4FB954BE8D5}"/>
+                </a:ext>
+              </a:extLst>
+            </p:cNvPr>
+            <p:cNvPicPr>
+              <a:picLocks noChangeAspect="1"/>
+            </p:cNvPicPr>
+            <p:nvPr/>
+          </p:nvPicPr>
+          <p:blipFill>
+            <a:blip r:embed="rId12">
+              <a:extLst>
+                <a:ext uri="{28A0092B-C50C-407E-A947-70E740481C1C}">
+                  <a14:useLocalDpi xmlns:a14="http://schemas.microsoft.com/office/drawing/2010/main" val="0"/>
+                </a:ext>
+              </a:extLst>
+            </a:blip>
+            <a:stretch>
+              <a:fillRect/>
+            </a:stretch>
+          </p:blipFill>
+          <p:spPr>
+            <a:xfrm>
+              <a:off x="4518354" y="870635"/>
+              <a:ext cx="1174780" cy="1174780"/>
+            </a:xfrm>
+            <a:prstGeom prst="rect">
+              <a:avLst/>
+            </a:prstGeom>
+          </p:spPr>
+        </p:pic>
+        <p:sp>
+          <p:nvSpPr>
+            <p:cNvPr id="14" name="Rectangle 13">
+              <a:extLst>
+                <a:ext uri="{FF2B5EF4-FFF2-40B4-BE49-F238E27FC236}">
+                  <a16:creationId xmlns:a16="http://schemas.microsoft.com/office/drawing/2014/main" id="{266FF006-9188-4D4A-8819-D14710DFC3FC}"/>
+                </a:ext>
+              </a:extLst>
+            </p:cNvPr>
+            <p:cNvSpPr/>
+            <p:nvPr/>
+          </p:nvSpPr>
+          <p:spPr>
+            <a:xfrm>
+              <a:off x="4015909" y="2149655"/>
+              <a:ext cx="2313711" cy="369332"/>
+            </a:xfrm>
+            <a:prstGeom prst="rect">
+              <a:avLst/>
+            </a:prstGeom>
+          </p:spPr>
+          <p:txBody>
+            <a:bodyPr wrap="none">
+              <a:spAutoFit/>
+            </a:bodyPr>
+            <a:lstStyle/>
+            <a:p>
+              <a:pPr algn="ctr"/>
+              <a:r>
+                <a:rPr lang="en-US" b="1" dirty="0">
+                  <a:solidFill>
+                    <a:srgbClr val="242525"/>
+                  </a:solidFill>
+                  <a:latin typeface="Tw Cen MT" panose="020B0602020104020603" pitchFamily="34" charset="0"/>
+                </a:rPr>
+                <a:t>experiencia21.tec.mx/</a:t>
+              </a:r>
+            </a:p>
+          </p:txBody>
+        </p:sp>
+      </p:grpSp>
+      <p:grpSp>
+        <p:nvGrpSpPr>
+          <p:cNvPr id="24" name="Group 23">
+            <a:extLst>
+              <a:ext uri="{FF2B5EF4-FFF2-40B4-BE49-F238E27FC236}">
+                <a16:creationId xmlns:a16="http://schemas.microsoft.com/office/drawing/2014/main" id="{9D776422-88CC-4BEC-852B-9499571E9F0D}"/>
+              </a:ext>
+            </a:extLst>
+          </p:cNvPr>
+          <p:cNvGrpSpPr/>
+          <p:nvPr/>
+        </p:nvGrpSpPr>
+        <p:grpSpPr>
+          <a:xfrm>
+            <a:off x="5772938" y="677262"/>
+            <a:ext cx="1850186" cy="1839469"/>
+            <a:chOff x="5810466" y="665478"/>
+            <a:chExt cx="1850186" cy="1839469"/>
+          </a:xfrm>
+        </p:grpSpPr>
+        <p:pic>
+          <p:nvPicPr>
+            <p:cNvPr id="65" name="Picture 64" descr="A close up of a sign&#10;&#10;Description automatically generated">
+              <a:extLst>
+                <a:ext uri="{FF2B5EF4-FFF2-40B4-BE49-F238E27FC236}">
+                  <a16:creationId xmlns:a16="http://schemas.microsoft.com/office/drawing/2014/main" id="{D2C2155D-B989-4097-96FD-A222071970EE}"/>
+                </a:ext>
+              </a:extLst>
+            </p:cNvPr>
+            <p:cNvPicPr>
+              <a:picLocks noChangeAspect="1"/>
+            </p:cNvPicPr>
+            <p:nvPr/>
+          </p:nvPicPr>
+          <p:blipFill>
+            <a:blip r:embed="rId13">
+              <a:extLst>
+                <a:ext uri="{28A0092B-C50C-407E-A947-70E740481C1C}">
+                  <a14:useLocalDpi xmlns:a14="http://schemas.microsoft.com/office/drawing/2010/main" val="0"/>
+                </a:ext>
+              </a:extLst>
+            </a:blip>
+            <a:srcRect l="5137" t="7417" r="7804" b="5524"/>
+            <a:stretch>
+              <a:fillRect/>
+            </a:stretch>
+          </p:blipFill>
+          <p:spPr>
+            <a:xfrm>
+              <a:off x="6095999" y="665478"/>
+              <a:ext cx="1398143" cy="1398143"/>
+            </a:xfrm>
+            <a:custGeom>
+              <a:avLst/>
+              <a:gdLst>
+                <a:gd name="connsiteX0" fmla="*/ 685800 w 1371600"/>
+                <a:gd name="connsiteY0" fmla="*/ 0 h 1371600"/>
+                <a:gd name="connsiteX1" fmla="*/ 1371600 w 1371600"/>
+                <a:gd name="connsiteY1" fmla="*/ 685800 h 1371600"/>
+                <a:gd name="connsiteX2" fmla="*/ 685800 w 1371600"/>
+                <a:gd name="connsiteY2" fmla="*/ 1371600 h 1371600"/>
+                <a:gd name="connsiteX3" fmla="*/ 0 w 1371600"/>
+                <a:gd name="connsiteY3" fmla="*/ 685800 h 1371600"/>
+                <a:gd name="connsiteX4" fmla="*/ 685800 w 1371600"/>
+                <a:gd name="connsiteY4" fmla="*/ 0 h 1371600"/>
+              </a:gdLst>
+              <a:ahLst/>
+              <a:cxnLst>
+                <a:cxn ang="0">
+                  <a:pos x="connsiteX0" y="connsiteY0"/>
+                </a:cxn>
+                <a:cxn ang="0">
+                  <a:pos x="connsiteX1" y="connsiteY1"/>
+                </a:cxn>
+                <a:cxn ang="0">
+                  <a:pos x="connsiteX2" y="connsiteY2"/>
+                </a:cxn>
+                <a:cxn ang="0">
+                  <a:pos x="connsiteX3" y="connsiteY3"/>
+                </a:cxn>
+                <a:cxn ang="0">
+                  <a:pos x="connsiteX4" y="connsiteY4"/>
+                </a:cxn>
+              </a:cxnLst>
+              <a:rect l="l" t="t" r="r" b="b"/>
+              <a:pathLst>
+                <a:path w="1371600" h="1371600">
+                  <a:moveTo>
+                    <a:pt x="685800" y="0"/>
+                  </a:moveTo>
+                  <a:cubicBezTo>
+                    <a:pt x="1064557" y="0"/>
+                    <a:pt x="1371600" y="307043"/>
+                    <a:pt x="1371600" y="685800"/>
+                  </a:cubicBezTo>
+                  <a:cubicBezTo>
+                    <a:pt x="1371600" y="1064557"/>
+                    <a:pt x="1064557" y="1371600"/>
+                    <a:pt x="685800" y="1371600"/>
+                  </a:cubicBezTo>
+                  <a:cubicBezTo>
+                    <a:pt x="307043" y="1371600"/>
+                    <a:pt x="0" y="1064557"/>
+                    <a:pt x="0" y="685800"/>
+                  </a:cubicBezTo>
+                  <a:cubicBezTo>
+                    <a:pt x="0" y="307043"/>
+                    <a:pt x="307043" y="0"/>
+                    <a:pt x="685800" y="0"/>
+                  </a:cubicBezTo>
+                  <a:close/>
+                </a:path>
+              </a:pathLst>
+            </a:custGeom>
+          </p:spPr>
+        </p:pic>
+        <p:sp>
+          <p:nvSpPr>
+            <p:cNvPr id="66" name="Rectangle 65">
+              <a:extLst>
+                <a:ext uri="{FF2B5EF4-FFF2-40B4-BE49-F238E27FC236}">
+                  <a16:creationId xmlns:a16="http://schemas.microsoft.com/office/drawing/2014/main" id="{D30AF6A0-1A4F-48F6-AAAD-7FAE002F71D8}"/>
+                </a:ext>
+              </a:extLst>
+            </p:cNvPr>
+            <p:cNvSpPr/>
+            <p:nvPr/>
+          </p:nvSpPr>
+          <p:spPr>
+            <a:xfrm>
+              <a:off x="5810466" y="2135615"/>
+              <a:ext cx="1850186" cy="369332"/>
+            </a:xfrm>
+            <a:prstGeom prst="rect">
+              <a:avLst/>
+            </a:prstGeom>
+          </p:spPr>
+          <p:txBody>
+            <a:bodyPr wrap="none">
+              <a:spAutoFit/>
+            </a:bodyPr>
+            <a:lstStyle/>
+            <a:p>
+              <a:pPr algn="ctr"/>
+              <a:r>
+                <a:rPr lang="en-US" b="1" dirty="0">
+                  <a:solidFill>
+                    <a:srgbClr val="4088FD"/>
+                  </a:solidFill>
+                  <a:latin typeface="Tw Cen MT" panose="020B0602020104020603" pitchFamily="34" charset="0"/>
+                </a:rPr>
+                <a:t>ID: 975 765 5185</a:t>
+              </a:r>
+            </a:p>
+          </p:txBody>
+        </p:sp>
       </p:grpSp>
     </p:spTree>
     <p:extLst>
@@ -24247,6 +26986,582 @@
       </p:transition>
     </mc:Fallback>
   </mc:AlternateContent>
+  <p:timing>
+    <p:tnLst>
+      <p:par>
+        <p:cTn id="1" dur="indefinite" restart="never" nodeType="tmRoot">
+          <p:childTnLst>
+            <p:seq concurrent="1" nextAc="seek">
+              <p:cTn id="2" dur="indefinite" nodeType="mainSeq">
+                <p:childTnLst>
+                  <p:par>
+                    <p:cTn id="3" fill="hold">
+                      <p:stCondLst>
+                        <p:cond delay="indefinite"/>
+                      </p:stCondLst>
+                      <p:childTnLst>
+                        <p:par>
+                          <p:cTn id="4" fill="hold">
+                            <p:stCondLst>
+                              <p:cond delay="0"/>
+                            </p:stCondLst>
+                            <p:childTnLst>
+                              <p:par>
+                                <p:cTn id="5" presetID="2" presetClass="entr" presetSubtype="4" fill="hold" nodeType="clickEffect">
+                                  <p:stCondLst>
+                                    <p:cond delay="0"/>
+                                  </p:stCondLst>
+                                  <p:childTnLst>
+                                    <p:set>
+                                      <p:cBhvr>
+                                        <p:cTn id="6" dur="1" fill="hold">
+                                          <p:stCondLst>
+                                            <p:cond delay="0"/>
+                                          </p:stCondLst>
+                                        </p:cTn>
+                                        <p:tgtEl>
+                                          <p:spTgt spid="10"/>
+                                        </p:tgtEl>
+                                        <p:attrNameLst>
+                                          <p:attrName>style.visibility</p:attrName>
+                                        </p:attrNameLst>
+                                      </p:cBhvr>
+                                      <p:to>
+                                        <p:strVal val="visible"/>
+                                      </p:to>
+                                    </p:set>
+                                    <p:anim calcmode="lin" valueType="num">
+                                      <p:cBhvr additive="base">
+                                        <p:cTn id="7" dur="500" fill="hold"/>
+                                        <p:tgtEl>
+                                          <p:spTgt spid="10"/>
+                                        </p:tgtEl>
+                                        <p:attrNameLst>
+                                          <p:attrName>ppt_x</p:attrName>
+                                        </p:attrNameLst>
+                                      </p:cBhvr>
+                                      <p:tavLst>
+                                        <p:tav tm="0">
+                                          <p:val>
+                                            <p:strVal val="#ppt_x"/>
+                                          </p:val>
+                                        </p:tav>
+                                        <p:tav tm="100000">
+                                          <p:val>
+                                            <p:strVal val="#ppt_x"/>
+                                          </p:val>
+                                        </p:tav>
+                                      </p:tavLst>
+                                    </p:anim>
+                                    <p:anim calcmode="lin" valueType="num">
+                                      <p:cBhvr additive="base">
+                                        <p:cTn id="8" dur="500" fill="hold"/>
+                                        <p:tgtEl>
+                                          <p:spTgt spid="10"/>
+                                        </p:tgtEl>
+                                        <p:attrNameLst>
+                                          <p:attrName>ppt_y</p:attrName>
+                                        </p:attrNameLst>
+                                      </p:cBhvr>
+                                      <p:tavLst>
+                                        <p:tav tm="0">
+                                          <p:val>
+                                            <p:strVal val="1+#ppt_h/2"/>
+                                          </p:val>
+                                        </p:tav>
+                                        <p:tav tm="100000">
+                                          <p:val>
+                                            <p:strVal val="#ppt_y"/>
+                                          </p:val>
+                                        </p:tav>
+                                      </p:tavLst>
+                                    </p:anim>
+                                  </p:childTnLst>
+                                </p:cTn>
+                              </p:par>
+                            </p:childTnLst>
+                          </p:cTn>
+                        </p:par>
+                      </p:childTnLst>
+                    </p:cTn>
+                  </p:par>
+                  <p:par>
+                    <p:cTn id="9" fill="hold">
+                      <p:stCondLst>
+                        <p:cond delay="indefinite"/>
+                      </p:stCondLst>
+                      <p:childTnLst>
+                        <p:par>
+                          <p:cTn id="10" fill="hold">
+                            <p:stCondLst>
+                              <p:cond delay="0"/>
+                            </p:stCondLst>
+                            <p:childTnLst>
+                              <p:par>
+                                <p:cTn id="11" presetID="2" presetClass="entr" presetSubtype="4" fill="hold" nodeType="clickEffect">
+                                  <p:stCondLst>
+                                    <p:cond delay="0"/>
+                                  </p:stCondLst>
+                                  <p:childTnLst>
+                                    <p:set>
+                                      <p:cBhvr>
+                                        <p:cTn id="12" dur="1" fill="hold">
+                                          <p:stCondLst>
+                                            <p:cond delay="0"/>
+                                          </p:stCondLst>
+                                        </p:cTn>
+                                        <p:tgtEl>
+                                          <p:spTgt spid="15"/>
+                                        </p:tgtEl>
+                                        <p:attrNameLst>
+                                          <p:attrName>style.visibility</p:attrName>
+                                        </p:attrNameLst>
+                                      </p:cBhvr>
+                                      <p:to>
+                                        <p:strVal val="visible"/>
+                                      </p:to>
+                                    </p:set>
+                                    <p:anim calcmode="lin" valueType="num">
+                                      <p:cBhvr additive="base">
+                                        <p:cTn id="13" dur="500" fill="hold"/>
+                                        <p:tgtEl>
+                                          <p:spTgt spid="15"/>
+                                        </p:tgtEl>
+                                        <p:attrNameLst>
+                                          <p:attrName>ppt_x</p:attrName>
+                                        </p:attrNameLst>
+                                      </p:cBhvr>
+                                      <p:tavLst>
+                                        <p:tav tm="0">
+                                          <p:val>
+                                            <p:strVal val="#ppt_x"/>
+                                          </p:val>
+                                        </p:tav>
+                                        <p:tav tm="100000">
+                                          <p:val>
+                                            <p:strVal val="#ppt_x"/>
+                                          </p:val>
+                                        </p:tav>
+                                      </p:tavLst>
+                                    </p:anim>
+                                    <p:anim calcmode="lin" valueType="num">
+                                      <p:cBhvr additive="base">
+                                        <p:cTn id="14" dur="500" fill="hold"/>
+                                        <p:tgtEl>
+                                          <p:spTgt spid="15"/>
+                                        </p:tgtEl>
+                                        <p:attrNameLst>
+                                          <p:attrName>ppt_y</p:attrName>
+                                        </p:attrNameLst>
+                                      </p:cBhvr>
+                                      <p:tavLst>
+                                        <p:tav tm="0">
+                                          <p:val>
+                                            <p:strVal val="1+#ppt_h/2"/>
+                                          </p:val>
+                                        </p:tav>
+                                        <p:tav tm="100000">
+                                          <p:val>
+                                            <p:strVal val="#ppt_y"/>
+                                          </p:val>
+                                        </p:tav>
+                                      </p:tavLst>
+                                    </p:anim>
+                                  </p:childTnLst>
+                                </p:cTn>
+                              </p:par>
+                            </p:childTnLst>
+                          </p:cTn>
+                        </p:par>
+                      </p:childTnLst>
+                    </p:cTn>
+                  </p:par>
+                  <p:par>
+                    <p:cTn id="15" fill="hold">
+                      <p:stCondLst>
+                        <p:cond delay="indefinite"/>
+                      </p:stCondLst>
+                      <p:childTnLst>
+                        <p:par>
+                          <p:cTn id="16" fill="hold">
+                            <p:stCondLst>
+                              <p:cond delay="0"/>
+                            </p:stCondLst>
+                            <p:childTnLst>
+                              <p:par>
+                                <p:cTn id="17" presetID="2" presetClass="entr" presetSubtype="4" fill="hold" nodeType="clickEffect">
+                                  <p:stCondLst>
+                                    <p:cond delay="0"/>
+                                  </p:stCondLst>
+                                  <p:childTnLst>
+                                    <p:set>
+                                      <p:cBhvr>
+                                        <p:cTn id="18" dur="1" fill="hold">
+                                          <p:stCondLst>
+                                            <p:cond delay="0"/>
+                                          </p:stCondLst>
+                                        </p:cTn>
+                                        <p:tgtEl>
+                                          <p:spTgt spid="24"/>
+                                        </p:tgtEl>
+                                        <p:attrNameLst>
+                                          <p:attrName>style.visibility</p:attrName>
+                                        </p:attrNameLst>
+                                      </p:cBhvr>
+                                      <p:to>
+                                        <p:strVal val="visible"/>
+                                      </p:to>
+                                    </p:set>
+                                    <p:anim calcmode="lin" valueType="num">
+                                      <p:cBhvr additive="base">
+                                        <p:cTn id="19" dur="500" fill="hold"/>
+                                        <p:tgtEl>
+                                          <p:spTgt spid="24"/>
+                                        </p:tgtEl>
+                                        <p:attrNameLst>
+                                          <p:attrName>ppt_x</p:attrName>
+                                        </p:attrNameLst>
+                                      </p:cBhvr>
+                                      <p:tavLst>
+                                        <p:tav tm="0">
+                                          <p:val>
+                                            <p:strVal val="#ppt_x"/>
+                                          </p:val>
+                                        </p:tav>
+                                        <p:tav tm="100000">
+                                          <p:val>
+                                            <p:strVal val="#ppt_x"/>
+                                          </p:val>
+                                        </p:tav>
+                                      </p:tavLst>
+                                    </p:anim>
+                                    <p:anim calcmode="lin" valueType="num">
+                                      <p:cBhvr additive="base">
+                                        <p:cTn id="20" dur="500" fill="hold"/>
+                                        <p:tgtEl>
+                                          <p:spTgt spid="24"/>
+                                        </p:tgtEl>
+                                        <p:attrNameLst>
+                                          <p:attrName>ppt_y</p:attrName>
+                                        </p:attrNameLst>
+                                      </p:cBhvr>
+                                      <p:tavLst>
+                                        <p:tav tm="0">
+                                          <p:val>
+                                            <p:strVal val="1+#ppt_h/2"/>
+                                          </p:val>
+                                        </p:tav>
+                                        <p:tav tm="100000">
+                                          <p:val>
+                                            <p:strVal val="#ppt_y"/>
+                                          </p:val>
+                                        </p:tav>
+                                      </p:tavLst>
+                                    </p:anim>
+                                  </p:childTnLst>
+                                </p:cTn>
+                              </p:par>
+                            </p:childTnLst>
+                          </p:cTn>
+                        </p:par>
+                      </p:childTnLst>
+                    </p:cTn>
+                  </p:par>
+                  <p:par>
+                    <p:cTn id="21" fill="hold">
+                      <p:stCondLst>
+                        <p:cond delay="indefinite"/>
+                      </p:stCondLst>
+                      <p:childTnLst>
+                        <p:par>
+                          <p:cTn id="22" fill="hold">
+                            <p:stCondLst>
+                              <p:cond delay="0"/>
+                            </p:stCondLst>
+                            <p:childTnLst>
+                              <p:par>
+                                <p:cTn id="23" presetID="2" presetClass="entr" presetSubtype="4" fill="hold" nodeType="clickEffect">
+                                  <p:stCondLst>
+                                    <p:cond delay="0"/>
+                                  </p:stCondLst>
+                                  <p:childTnLst>
+                                    <p:set>
+                                      <p:cBhvr>
+                                        <p:cTn id="24" dur="1" fill="hold">
+                                          <p:stCondLst>
+                                            <p:cond delay="0"/>
+                                          </p:stCondLst>
+                                        </p:cTn>
+                                        <p:tgtEl>
+                                          <p:spTgt spid="13"/>
+                                        </p:tgtEl>
+                                        <p:attrNameLst>
+                                          <p:attrName>style.visibility</p:attrName>
+                                        </p:attrNameLst>
+                                      </p:cBhvr>
+                                      <p:to>
+                                        <p:strVal val="visible"/>
+                                      </p:to>
+                                    </p:set>
+                                    <p:anim calcmode="lin" valueType="num">
+                                      <p:cBhvr additive="base">
+                                        <p:cTn id="25" dur="500" fill="hold"/>
+                                        <p:tgtEl>
+                                          <p:spTgt spid="13"/>
+                                        </p:tgtEl>
+                                        <p:attrNameLst>
+                                          <p:attrName>ppt_x</p:attrName>
+                                        </p:attrNameLst>
+                                      </p:cBhvr>
+                                      <p:tavLst>
+                                        <p:tav tm="0">
+                                          <p:val>
+                                            <p:strVal val="#ppt_x"/>
+                                          </p:val>
+                                        </p:tav>
+                                        <p:tav tm="100000">
+                                          <p:val>
+                                            <p:strVal val="#ppt_x"/>
+                                          </p:val>
+                                        </p:tav>
+                                      </p:tavLst>
+                                    </p:anim>
+                                    <p:anim calcmode="lin" valueType="num">
+                                      <p:cBhvr additive="base">
+                                        <p:cTn id="26" dur="500" fill="hold"/>
+                                        <p:tgtEl>
+                                          <p:spTgt spid="13"/>
+                                        </p:tgtEl>
+                                        <p:attrNameLst>
+                                          <p:attrName>ppt_y</p:attrName>
+                                        </p:attrNameLst>
+                                      </p:cBhvr>
+                                      <p:tavLst>
+                                        <p:tav tm="0">
+                                          <p:val>
+                                            <p:strVal val="1+#ppt_h/2"/>
+                                          </p:val>
+                                        </p:tav>
+                                        <p:tav tm="100000">
+                                          <p:val>
+                                            <p:strVal val="#ppt_y"/>
+                                          </p:val>
+                                        </p:tav>
+                                      </p:tavLst>
+                                    </p:anim>
+                                  </p:childTnLst>
+                                </p:cTn>
+                              </p:par>
+                            </p:childTnLst>
+                          </p:cTn>
+                        </p:par>
+                      </p:childTnLst>
+                    </p:cTn>
+                  </p:par>
+                  <p:par>
+                    <p:cTn id="27" fill="hold">
+                      <p:stCondLst>
+                        <p:cond delay="indefinite"/>
+                      </p:stCondLst>
+                      <p:childTnLst>
+                        <p:par>
+                          <p:cTn id="28" fill="hold">
+                            <p:stCondLst>
+                              <p:cond delay="0"/>
+                            </p:stCondLst>
+                            <p:childTnLst>
+                              <p:par>
+                                <p:cTn id="29" presetID="2" presetClass="entr" presetSubtype="4" fill="hold" nodeType="clickEffect">
+                                  <p:stCondLst>
+                                    <p:cond delay="0"/>
+                                  </p:stCondLst>
+                                  <p:childTnLst>
+                                    <p:set>
+                                      <p:cBhvr>
+                                        <p:cTn id="30" dur="1" fill="hold">
+                                          <p:stCondLst>
+                                            <p:cond delay="0"/>
+                                          </p:stCondLst>
+                                        </p:cTn>
+                                        <p:tgtEl>
+                                          <p:spTgt spid="11"/>
+                                        </p:tgtEl>
+                                        <p:attrNameLst>
+                                          <p:attrName>style.visibility</p:attrName>
+                                        </p:attrNameLst>
+                                      </p:cBhvr>
+                                      <p:to>
+                                        <p:strVal val="visible"/>
+                                      </p:to>
+                                    </p:set>
+                                    <p:anim calcmode="lin" valueType="num">
+                                      <p:cBhvr additive="base">
+                                        <p:cTn id="31" dur="500" fill="hold"/>
+                                        <p:tgtEl>
+                                          <p:spTgt spid="11"/>
+                                        </p:tgtEl>
+                                        <p:attrNameLst>
+                                          <p:attrName>ppt_x</p:attrName>
+                                        </p:attrNameLst>
+                                      </p:cBhvr>
+                                      <p:tavLst>
+                                        <p:tav tm="0">
+                                          <p:val>
+                                            <p:strVal val="#ppt_x"/>
+                                          </p:val>
+                                        </p:tav>
+                                        <p:tav tm="100000">
+                                          <p:val>
+                                            <p:strVal val="#ppt_x"/>
+                                          </p:val>
+                                        </p:tav>
+                                      </p:tavLst>
+                                    </p:anim>
+                                    <p:anim calcmode="lin" valueType="num">
+                                      <p:cBhvr additive="base">
+                                        <p:cTn id="32" dur="500" fill="hold"/>
+                                        <p:tgtEl>
+                                          <p:spTgt spid="11"/>
+                                        </p:tgtEl>
+                                        <p:attrNameLst>
+                                          <p:attrName>ppt_y</p:attrName>
+                                        </p:attrNameLst>
+                                      </p:cBhvr>
+                                      <p:tavLst>
+                                        <p:tav tm="0">
+                                          <p:val>
+                                            <p:strVal val="1+#ppt_h/2"/>
+                                          </p:val>
+                                        </p:tav>
+                                        <p:tav tm="100000">
+                                          <p:val>
+                                            <p:strVal val="#ppt_y"/>
+                                          </p:val>
+                                        </p:tav>
+                                      </p:tavLst>
+                                    </p:anim>
+                                  </p:childTnLst>
+                                </p:cTn>
+                              </p:par>
+                            </p:childTnLst>
+                          </p:cTn>
+                        </p:par>
+                      </p:childTnLst>
+                    </p:cTn>
+                  </p:par>
+                  <p:par>
+                    <p:cTn id="33" fill="hold">
+                      <p:stCondLst>
+                        <p:cond delay="indefinite"/>
+                      </p:stCondLst>
+                      <p:childTnLst>
+                        <p:par>
+                          <p:cTn id="34" fill="hold">
+                            <p:stCondLst>
+                              <p:cond delay="0"/>
+                            </p:stCondLst>
+                            <p:childTnLst>
+                              <p:par>
+                                <p:cTn id="35" presetID="2" presetClass="entr" presetSubtype="4" fill="hold" nodeType="clickEffect">
+                                  <p:stCondLst>
+                                    <p:cond delay="0"/>
+                                  </p:stCondLst>
+                                  <p:childTnLst>
+                                    <p:set>
+                                      <p:cBhvr>
+                                        <p:cTn id="36" dur="1" fill="hold">
+                                          <p:stCondLst>
+                                            <p:cond delay="0"/>
+                                          </p:stCondLst>
+                                        </p:cTn>
+                                        <p:tgtEl>
+                                          <p:spTgt spid="12"/>
+                                        </p:tgtEl>
+                                        <p:attrNameLst>
+                                          <p:attrName>style.visibility</p:attrName>
+                                        </p:attrNameLst>
+                                      </p:cBhvr>
+                                      <p:to>
+                                        <p:strVal val="visible"/>
+                                      </p:to>
+                                    </p:set>
+                                    <p:anim calcmode="lin" valueType="num">
+                                      <p:cBhvr additive="base">
+                                        <p:cTn id="37" dur="500" fill="hold"/>
+                                        <p:tgtEl>
+                                          <p:spTgt spid="12"/>
+                                        </p:tgtEl>
+                                        <p:attrNameLst>
+                                          <p:attrName>ppt_x</p:attrName>
+                                        </p:attrNameLst>
+                                      </p:cBhvr>
+                                      <p:tavLst>
+                                        <p:tav tm="0">
+                                          <p:val>
+                                            <p:strVal val="#ppt_x"/>
+                                          </p:val>
+                                        </p:tav>
+                                        <p:tav tm="100000">
+                                          <p:val>
+                                            <p:strVal val="#ppt_x"/>
+                                          </p:val>
+                                        </p:tav>
+                                      </p:tavLst>
+                                    </p:anim>
+                                    <p:anim calcmode="lin" valueType="num">
+                                      <p:cBhvr additive="base">
+                                        <p:cTn id="38" dur="500" fill="hold"/>
+                                        <p:tgtEl>
+                                          <p:spTgt spid="12"/>
+                                        </p:tgtEl>
+                                        <p:attrNameLst>
+                                          <p:attrName>ppt_y</p:attrName>
+                                        </p:attrNameLst>
+                                      </p:cBhvr>
+                                      <p:tavLst>
+                                        <p:tav tm="0">
+                                          <p:val>
+                                            <p:strVal val="1+#ppt_h/2"/>
+                                          </p:val>
+                                        </p:tav>
+                                        <p:tav tm="100000">
+                                          <p:val>
+                                            <p:strVal val="#ppt_y"/>
+                                          </p:val>
+                                        </p:tav>
+                                      </p:tavLst>
+                                    </p:anim>
+                                  </p:childTnLst>
+                                </p:cTn>
+                              </p:par>
+                            </p:childTnLst>
+                          </p:cTn>
+                        </p:par>
+                      </p:childTnLst>
+                    </p:cTn>
+                  </p:par>
+                </p:childTnLst>
+              </p:cTn>
+              <p:prevCondLst>
+                <p:cond evt="onPrev" delay="0">
+                  <p:tgtEl>
+                    <p:sldTgt/>
+                  </p:tgtEl>
+                </p:cond>
+              </p:prevCondLst>
+              <p:nextCondLst>
+                <p:cond evt="onNext" delay="0">
+                  <p:tgtEl>
+                    <p:sldTgt/>
+                  </p:tgtEl>
+                </p:cond>
+              </p:nextCondLst>
+            </p:seq>
+          </p:childTnLst>
+        </p:cTn>
+      </p:par>
+    </p:tnLst>
+  </p:timing>
 </p:sld>
 </file>
 

</xml_diff>